<commit_message>
Mise a jour cours et TP 3 et 4
</commit_message>
<xml_diff>
--- a/cours/2015_05_GPU.pptx
+++ b/cours/2015_05_GPU.pptx
@@ -5,10 +5,10 @@
     <p:sldMasterId id="2147483648" r:id="rId1"/>
   </p:sldMasterIdLst>
   <p:notesMasterIdLst>
-    <p:notesMasterId r:id="rId56"/>
+    <p:notesMasterId r:id="rId54"/>
   </p:notesMasterIdLst>
   <p:handoutMasterIdLst>
-    <p:handoutMasterId r:id="rId57"/>
+    <p:handoutMasterId r:id="rId55"/>
   </p:handoutMasterIdLst>
   <p:sldIdLst>
     <p:sldId id="281" r:id="rId2"/>
@@ -50,21 +50,19 @@
     <p:sldId id="318" r:id="rId38"/>
     <p:sldId id="319" r:id="rId39"/>
     <p:sldId id="320" r:id="rId40"/>
-    <p:sldId id="321" r:id="rId41"/>
-    <p:sldId id="322" r:id="rId42"/>
-    <p:sldId id="323" r:id="rId43"/>
-    <p:sldId id="324" r:id="rId44"/>
-    <p:sldId id="325" r:id="rId45"/>
-    <p:sldId id="326" r:id="rId46"/>
-    <p:sldId id="327" r:id="rId47"/>
-    <p:sldId id="328" r:id="rId48"/>
-    <p:sldId id="329" r:id="rId49"/>
-    <p:sldId id="330" r:id="rId50"/>
-    <p:sldId id="331" r:id="rId51"/>
-    <p:sldId id="332" r:id="rId52"/>
-    <p:sldId id="333" r:id="rId53"/>
-    <p:sldId id="334" r:id="rId54"/>
-    <p:sldId id="335" r:id="rId55"/>
+    <p:sldId id="322" r:id="rId41"/>
+    <p:sldId id="324" r:id="rId42"/>
+    <p:sldId id="325" r:id="rId43"/>
+    <p:sldId id="326" r:id="rId44"/>
+    <p:sldId id="327" r:id="rId45"/>
+    <p:sldId id="328" r:id="rId46"/>
+    <p:sldId id="329" r:id="rId47"/>
+    <p:sldId id="330" r:id="rId48"/>
+    <p:sldId id="331" r:id="rId49"/>
+    <p:sldId id="332" r:id="rId50"/>
+    <p:sldId id="333" r:id="rId51"/>
+    <p:sldId id="334" r:id="rId52"/>
+    <p:sldId id="335" r:id="rId53"/>
   </p:sldIdLst>
   <p:sldSz cx="9144000" cy="6858000" type="screen4x3"/>
   <p:notesSz cx="6858000" cy="9144000"/>
@@ -248,7 +246,7 @@
           <a:p>
             <a:fld id="{801DB4AD-0506-804D-9177-ECB4D2AAA278}" type="datetimeFigureOut">
               <a:rPr lang="fr-FR" smtClean="0"/>
-              <a:t>07/09/15</a:t>
+              <a:t>18/09/15</a:t>
             </a:fld>
             <a:endParaRPr lang="fr-FR"/>
           </a:p>
@@ -414,7 +412,7 @@
           <a:p>
             <a:fld id="{A81B47BE-82C2-FD4D-9B98-CA52A80151C0}" type="datetimeFigureOut">
               <a:rPr lang="fr-FR" smtClean="0"/>
-              <a:t>07/09/15</a:t>
+              <a:t>18/09/15</a:t>
             </a:fld>
             <a:endParaRPr lang="fr-FR"/>
           </a:p>
@@ -1086,7 +1084,6 @@
               <a:rPr lang="fr-FR" b="1" dirty="0" smtClean="0"/>
               <a:t>Rémi Ronfard - GMIN317 – GPU </a:t>
             </a:r>
-            <a:endParaRPr lang="fr-FR" b="1" dirty="0" smtClean="0"/>
           </a:p>
         </p:txBody>
       </p:sp>
@@ -1224,7 +1221,7 @@
           <a:p>
             <a:fld id="{599A35EA-E2E2-B040-B017-02C73C819571}" type="datetime1">
               <a:rPr lang="fr-FR" smtClean="0"/>
-              <a:t>07/09/15</a:t>
+              <a:t>18/09/15</a:t>
             </a:fld>
             <a:endParaRPr lang="fr-FR" dirty="0"/>
           </a:p>
@@ -1560,7 +1557,7 @@
           <a:p>
             <a:fld id="{3796A373-D9A3-8945-922F-1DCC551B480B}" type="datetime1">
               <a:rPr lang="fr-FR" smtClean="0"/>
-              <a:t>07/09/15</a:t>
+              <a:t>18/09/15</a:t>
             </a:fld>
             <a:endParaRPr lang="fr-FR" dirty="0"/>
           </a:p>
@@ -1944,7 +1941,7 @@
           <a:p>
             <a:fld id="{9E99FD3A-69BF-3649-B76F-8B00F495132E}" type="datetime1">
               <a:rPr lang="fr-FR" smtClean="0"/>
-              <a:t>07/09/15</a:t>
+              <a:t>18/09/15</a:t>
             </a:fld>
             <a:endParaRPr lang="fr-FR" dirty="0"/>
           </a:p>
@@ -2376,7 +2373,7 @@
           <a:p>
             <a:fld id="{EEA36F91-B38D-6B4B-8F25-FA509C3CCD14}" type="datetime1">
               <a:rPr lang="fr-FR" smtClean="0"/>
-              <a:t>07/09/15</a:t>
+              <a:t>18/09/15</a:t>
             </a:fld>
             <a:endParaRPr lang="fr-FR" dirty="0"/>
           </a:p>
@@ -2808,7 +2805,7 @@
           <a:p>
             <a:fld id="{F21ED5D8-9110-9046-B558-01290C6D66E8}" type="datetime1">
               <a:rPr lang="fr-FR" smtClean="0"/>
-              <a:t>07/09/15</a:t>
+              <a:t>18/09/15</a:t>
             </a:fld>
             <a:endParaRPr lang="fr-FR" dirty="0"/>
           </a:p>
@@ -3240,7 +3237,7 @@
           <a:p>
             <a:fld id="{D6710C9B-6248-B04F-AAC2-4C1850B2768F}" type="datetime1">
               <a:rPr lang="fr-FR" smtClean="0"/>
-              <a:t>07/09/15</a:t>
+              <a:t>18/09/15</a:t>
             </a:fld>
             <a:endParaRPr lang="fr-FR" dirty="0"/>
           </a:p>
@@ -4009,7 +4006,7 @@
           <a:p>
             <a:fld id="{08F30642-7B04-0049-8B6D-36F6604B3334}" type="datetime1">
               <a:rPr lang="fr-FR" smtClean="0"/>
-              <a:t>07/09/15</a:t>
+              <a:t>18/09/15</a:t>
             </a:fld>
             <a:endParaRPr lang="fr-FR" dirty="0"/>
           </a:p>
@@ -4895,7 +4892,7 @@
           <a:p>
             <a:fld id="{49E848B1-18AA-8E4F-9F25-0BAFB094058D}" type="datetime1">
               <a:rPr lang="fr-FR" smtClean="0"/>
-              <a:t>07/09/15</a:t>
+              <a:t>18/09/15</a:t>
             </a:fld>
             <a:endParaRPr lang="fr-FR" dirty="0"/>
           </a:p>
@@ -5164,7 +5161,7 @@
           <a:p>
             <a:fld id="{413CF03E-155F-1E4B-83AF-F21F75CEBC4D}" type="datetime1">
               <a:rPr lang="fr-FR" smtClean="0"/>
-              <a:t>07/09/15</a:t>
+              <a:t>18/09/15</a:t>
             </a:fld>
             <a:endParaRPr lang="fr-FR" dirty="0"/>
           </a:p>
@@ -5393,7 +5390,7 @@
           <a:p>
             <a:fld id="{FBCFCC4E-C49E-714F-9155-0B60C87CBE39}" type="datetime1">
               <a:rPr lang="fr-FR" smtClean="0"/>
-              <a:t>07/09/15</a:t>
+              <a:t>18/09/15</a:t>
             </a:fld>
             <a:endParaRPr lang="fr-FR" dirty="0"/>
           </a:p>
@@ -5582,7 +5579,7 @@
           <a:p>
             <a:fld id="{29C17A4B-DC45-D14D-84CD-F9D7B4511B23}" type="datetime1">
               <a:rPr lang="fr-FR" smtClean="0"/>
-              <a:t>07/09/15</a:t>
+              <a:t>18/09/15</a:t>
             </a:fld>
             <a:endParaRPr lang="fr-FR" dirty="0"/>
           </a:p>
@@ -6146,7 +6143,7 @@
           <a:p>
             <a:fld id="{160FCDCD-6FB3-FF44-A119-7D937782CA9C}" type="datetime1">
               <a:rPr lang="fr-FR" smtClean="0"/>
-              <a:t>07/09/15</a:t>
+              <a:t>18/09/15</a:t>
             </a:fld>
             <a:endParaRPr lang="fr-FR" dirty="0"/>
           </a:p>
@@ -6331,7 +6328,7 @@
           <a:p>
             <a:fld id="{E2F8BCB6-3FAF-BB43-BF94-1BAC4E8BDB17}" type="datetime1">
               <a:rPr lang="fr-FR" smtClean="0"/>
-              <a:t>07/09/15</a:t>
+              <a:t>18/09/15</a:t>
             </a:fld>
             <a:endParaRPr lang="fr-FR" dirty="0"/>
           </a:p>
@@ -6542,7 +6539,7 @@
           <a:p>
             <a:fld id="{BF7E20D7-724E-6D4D-8C2A-0B85083D3BC0}" type="datetime1">
               <a:rPr lang="fr-FR" smtClean="0"/>
-              <a:t>07/09/15</a:t>
+              <a:t>18/09/15</a:t>
             </a:fld>
             <a:endParaRPr lang="fr-FR" dirty="0"/>
           </a:p>
@@ -6795,7 +6792,7 @@
           <a:p>
             <a:fld id="{A3BB5F53-6874-C746-88F3-C2744840E38B}" type="datetime1">
               <a:rPr lang="fr-FR" smtClean="0"/>
-              <a:t>07/09/15</a:t>
+              <a:t>18/09/15</a:t>
             </a:fld>
             <a:endParaRPr lang="fr-FR" dirty="0"/>
           </a:p>
@@ -7005,7 +7002,7 @@
           <a:p>
             <a:fld id="{FE558EB6-67B9-2045-BBA6-E8BE5FD54007}" type="datetime1">
               <a:rPr lang="fr-FR" smtClean="0"/>
-              <a:t>07/09/15</a:t>
+              <a:t>18/09/15</a:t>
             </a:fld>
             <a:endParaRPr lang="fr-FR" dirty="0"/>
           </a:p>
@@ -7180,7 +7177,7 @@
           <a:p>
             <a:fld id="{AD57D3FB-4E65-8B42-8C15-3641FDDBCF2F}" type="datetime1">
               <a:rPr lang="fr-FR" smtClean="0"/>
-              <a:t>07/09/15</a:t>
+              <a:t>18/09/15</a:t>
             </a:fld>
             <a:endParaRPr lang="fr-FR" dirty="0"/>
           </a:p>
@@ -7322,7 +7319,7 @@
           <a:p>
             <a:fld id="{ED6E3B63-E702-8045-9CEC-D43C57AD17DA}" type="datetime1">
               <a:rPr lang="fr-FR" smtClean="0"/>
-              <a:t>07/09/15</a:t>
+              <a:t>18/09/15</a:t>
             </a:fld>
             <a:endParaRPr lang="fr-FR" dirty="0"/>
           </a:p>
@@ -7569,7 +7566,7 @@
           <a:p>
             <a:fld id="{272AEF25-1B4A-654B-99CF-19B93367B5F4}" type="datetime1">
               <a:rPr lang="fr-FR" smtClean="0"/>
-              <a:t>07/09/15</a:t>
+              <a:t>18/09/15</a:t>
             </a:fld>
             <a:endParaRPr lang="fr-FR" dirty="0"/>
           </a:p>
@@ -7857,7 +7854,7 @@
           <a:p>
             <a:fld id="{55B78679-D582-5D4F-A117-A789B40DA18F}" type="datetime1">
               <a:rPr lang="fr-FR" smtClean="0"/>
-              <a:t>07/09/15</a:t>
+              <a:t>18/09/15</a:t>
             </a:fld>
             <a:endParaRPr lang="fr-FR" dirty="0"/>
           </a:p>
@@ -8111,7 +8108,7 @@
           <a:p>
             <a:fld id="{13867D73-D2D8-0D45-AEB2-F913B7FF1130}" type="datetime1">
               <a:rPr lang="fr-FR" smtClean="0"/>
-              <a:t>07/09/15</a:t>
+              <a:t>18/09/15</a:t>
             </a:fld>
             <a:endParaRPr lang="fr-FR" dirty="0"/>
           </a:p>
@@ -8417,7 +8414,7 @@
           <a:p>
             <a:fld id="{3811DD04-BCCE-9A4B-B104-AFDD2798EB98}" type="datetime1">
               <a:rPr lang="fr-FR" smtClean="0"/>
-              <a:t>07/09/15</a:t>
+              <a:t>18/09/15</a:t>
             </a:fld>
             <a:endParaRPr lang="fr-FR" dirty="0"/>
           </a:p>
@@ -8861,7 +8858,7 @@
           <a:p>
             <a:fld id="{56BAA11B-CE14-794B-B22E-0EEAA60CE68A}" type="datetime1">
               <a:rPr lang="fr-FR" smtClean="0"/>
-              <a:t>07/09/15</a:t>
+              <a:t>18/09/15</a:t>
             </a:fld>
             <a:endParaRPr lang="fr-FR" dirty="0"/>
           </a:p>
@@ -9021,7 +9018,7 @@
           <a:p>
             <a:fld id="{C148A193-A419-DC46-9DCE-E3D6345A265B}" type="datetime1">
               <a:rPr lang="fr-FR" smtClean="0"/>
-              <a:t>07/09/15</a:t>
+              <a:t>18/09/15</a:t>
             </a:fld>
             <a:endParaRPr lang="fr-FR" dirty="0"/>
           </a:p>
@@ -9078,7 +9075,15 @@
             </a:pPr>
             <a:r>
               <a:rPr lang="fr-FR" dirty="0"/>
-              <a:t>Le programme principale remplis des buffers de la mémoire géré par OpenGL avec des vertex </a:t>
+              <a:t>Le programme </a:t>
+            </a:r>
+            <a:r>
+              <a:rPr lang="fr-FR" dirty="0" smtClean="0"/>
+              <a:t>principal remplit </a:t>
+            </a:r>
+            <a:r>
+              <a:rPr lang="fr-FR" dirty="0"/>
+              <a:t>des buffers de la mémoire géré par OpenGL avec des vertex </a:t>
             </a:r>
             <a:r>
               <a:rPr lang="fr-FR" dirty="0" err="1"/>
@@ -9354,7 +9359,7 @@
           <a:p>
             <a:fld id="{7A24361F-5B59-3F4F-95CE-68EF9ED8BB63}" type="datetime1">
               <a:rPr lang="fr-FR" smtClean="0"/>
-              <a:t>07/09/15</a:t>
+              <a:t>18/09/15</a:t>
             </a:fld>
             <a:endParaRPr lang="fr-FR" dirty="0"/>
           </a:p>
@@ -9511,7 +9516,7 @@
           <a:p>
             <a:fld id="{84D642AF-E024-1F44-9CAE-78A6C4E99F7C}" type="datetime1">
               <a:rPr lang="fr-FR" smtClean="0"/>
-              <a:t>07/09/15</a:t>
+              <a:t>18/09/15</a:t>
             </a:fld>
             <a:endParaRPr lang="fr-FR" dirty="0"/>
           </a:p>
@@ -9540,8 +9545,8 @@
         </p:blipFill>
         <p:spPr bwMode="auto">
           <a:xfrm>
-            <a:off x="3523279" y="973667"/>
-            <a:ext cx="3224654" cy="5319018"/>
+            <a:off x="3240386" y="507038"/>
+            <a:ext cx="3596471" cy="5932325"/>
           </a:xfrm>
           <a:prstGeom prst="rect">
             <a:avLst/>
@@ -9828,7 +9833,7 @@
           <a:p>
             <a:fld id="{C74591BD-2AE7-5F43-8289-46DC0ECC3C4B}" type="datetime1">
               <a:rPr lang="fr-FR" smtClean="0"/>
-              <a:t>07/09/15</a:t>
+              <a:t>18/09/15</a:t>
             </a:fld>
             <a:endParaRPr lang="fr-FR" dirty="0"/>
           </a:p>
@@ -10077,7 +10082,7 @@
           <a:p>
             <a:fld id="{7D293861-0AB5-864D-84B6-194F741CCDE0}" type="datetime1">
               <a:rPr lang="fr-FR" smtClean="0"/>
-              <a:t>07/09/15</a:t>
+              <a:t>18/09/15</a:t>
             </a:fld>
             <a:endParaRPr lang="fr-FR" dirty="0"/>
           </a:p>
@@ -10243,7 +10248,7 @@
           <a:p>
             <a:fld id="{78711FA9-0693-8649-ACA4-EDA78EE6A1C4}" type="datetime1">
               <a:rPr lang="fr-FR" smtClean="0"/>
-              <a:t>07/09/15</a:t>
+              <a:t>18/09/15</a:t>
             </a:fld>
             <a:endParaRPr lang="fr-FR" dirty="0"/>
           </a:p>
@@ -10386,7 +10391,7 @@
           <a:p>
             <a:fld id="{4FA8F6F2-5B35-8A4A-84FA-965C8AB705A5}" type="datetime1">
               <a:rPr lang="fr-FR" smtClean="0"/>
-              <a:t>07/09/15</a:t>
+              <a:t>18/09/15</a:t>
             </a:fld>
             <a:endParaRPr lang="fr-FR" dirty="0"/>
           </a:p>
@@ -10609,7 +10614,7 @@
           <a:p>
             <a:fld id="{ADDAAC3C-FE89-0E4C-87B6-FE4324EFD390}" type="datetime1">
               <a:rPr lang="fr-FR" smtClean="0"/>
-              <a:t>07/09/15</a:t>
+              <a:t>18/09/15</a:t>
             </a:fld>
             <a:endParaRPr lang="fr-FR" dirty="0"/>
           </a:p>
@@ -10882,7 +10887,7 @@
           <a:p>
             <a:fld id="{8E439F01-62B8-724C-920A-79241FFC8EEA}" type="datetime1">
               <a:rPr lang="fr-FR" smtClean="0"/>
-              <a:t>07/09/15</a:t>
+              <a:t>18/09/15</a:t>
             </a:fld>
             <a:endParaRPr lang="fr-FR" dirty="0"/>
           </a:p>
@@ -11260,7 +11265,7 @@
           <a:p>
             <a:fld id="{B14432FF-7314-9C44-A695-EE1A3DF2D06A}" type="datetime1">
               <a:rPr lang="fr-FR" smtClean="0"/>
-              <a:t>07/09/15</a:t>
+              <a:t>18/09/15</a:t>
             </a:fld>
             <a:endParaRPr lang="fr-FR" dirty="0"/>
           </a:p>
@@ -11288,8 +11293,8 @@
         </p:blipFill>
         <p:spPr>
           <a:xfrm>
-            <a:off x="387392" y="1844824"/>
-            <a:ext cx="4223031" cy="3117830"/>
+            <a:off x="150001" y="2094099"/>
+            <a:ext cx="3327775" cy="2456870"/>
           </a:xfrm>
           <a:prstGeom prst="rect">
             <a:avLst/>
@@ -11318,8 +11323,8 @@
         </p:blipFill>
         <p:spPr>
           <a:xfrm>
-            <a:off x="4860032" y="2191737"/>
-            <a:ext cx="3965220" cy="2749431"/>
+            <a:off x="3583974" y="1519385"/>
+            <a:ext cx="5389465" cy="3736984"/>
           </a:xfrm>
           <a:prstGeom prst="rect">
             <a:avLst/>
@@ -11334,7 +11339,7 @@
         </p:nvSpPr>
         <p:spPr>
           <a:xfrm>
-            <a:off x="965200" y="5256369"/>
+            <a:off x="965200" y="5441035"/>
             <a:ext cx="7061200" cy="369332"/>
           </a:xfrm>
           <a:prstGeom prst="rect">
@@ -11389,103 +11394,6 @@
           <a:chExt cx="0" cy="0"/>
         </a:xfrm>
       </p:grpSpPr>
-      <p:sp>
-        <p:nvSpPr>
-          <p:cNvPr id="2" name="Titre 1"/>
-          <p:cNvSpPr>
-            <a:spLocks noGrp="1"/>
-          </p:cNvSpPr>
-          <p:nvPr>
-            <p:ph type="title"/>
-          </p:nvPr>
-        </p:nvSpPr>
-        <p:spPr/>
-        <p:txBody>
-          <a:bodyPr/>
-          <a:lstStyle/>
-          <a:p>
-            <a:r>
-              <a:rPr lang="fr-FR" dirty="0" smtClean="0"/>
-              <a:t>Pixel </a:t>
-            </a:r>
-            <a:r>
-              <a:rPr lang="fr-FR" dirty="0" err="1" smtClean="0"/>
-              <a:t>Shader</a:t>
-            </a:r>
-            <a:endParaRPr lang="fr-FR" dirty="0"/>
-          </a:p>
-        </p:txBody>
-      </p:sp>
-      <p:sp>
-        <p:nvSpPr>
-          <p:cNvPr id="4" name="Espace réservé du pied de page 3"/>
-          <p:cNvSpPr>
-            <a:spLocks noGrp="1"/>
-          </p:cNvSpPr>
-          <p:nvPr>
-            <p:ph type="ftr" sz="quarter" idx="3"/>
-          </p:nvPr>
-        </p:nvSpPr>
-        <p:spPr/>
-        <p:txBody>
-          <a:bodyPr/>
-          <a:lstStyle/>
-          <a:p>
-            <a:r>
-              <a:rPr lang="fr-FR" b="1" dirty="0" smtClean="0"/>
-              <a:t>Rémi Ronfard - GMIN317 – GPU </a:t>
-            </a:r>
-            <a:endParaRPr lang="fr-FR" b="1" dirty="0"/>
-          </a:p>
-        </p:txBody>
-      </p:sp>
-      <p:sp>
-        <p:nvSpPr>
-          <p:cNvPr id="5" name="Espace réservé du numéro de diapositive 4"/>
-          <p:cNvSpPr>
-            <a:spLocks noGrp="1"/>
-          </p:cNvSpPr>
-          <p:nvPr>
-            <p:ph type="sldNum" sz="quarter" idx="4"/>
-          </p:nvPr>
-        </p:nvSpPr>
-        <p:spPr/>
-        <p:txBody>
-          <a:bodyPr/>
-          <a:lstStyle/>
-          <a:p>
-            <a:fld id="{A6C87E8C-A1B1-CC4A-8C89-9A370644B80A}" type="slidenum">
-              <a:rPr lang="fr-FR" smtClean="0"/>
-              <a:pPr/>
-              <a:t>34</a:t>
-            </a:fld>
-            <a:endParaRPr lang="fr-FR" dirty="0"/>
-          </a:p>
-        </p:txBody>
-      </p:sp>
-      <p:sp>
-        <p:nvSpPr>
-          <p:cNvPr id="6" name="Espace réservé de la date 5"/>
-          <p:cNvSpPr>
-            <a:spLocks noGrp="1"/>
-          </p:cNvSpPr>
-          <p:nvPr>
-            <p:ph type="dt" sz="half" idx="2"/>
-          </p:nvPr>
-        </p:nvSpPr>
-        <p:spPr/>
-        <p:txBody>
-          <a:bodyPr/>
-          <a:lstStyle/>
-          <a:p>
-            <a:fld id="{609FCB34-7A6F-D943-86A1-3B373F5C57D2}" type="datetime1">
-              <a:rPr lang="fr-FR" smtClean="0"/>
-              <a:t>07/09/15</a:t>
-            </a:fld>
-            <a:endParaRPr lang="fr-FR" dirty="0"/>
-          </a:p>
-        </p:txBody>
-      </p:sp>
       <p:pic>
         <p:nvPicPr>
           <p:cNvPr id="7" name="Picture 2"/>
@@ -11508,14 +11416,111 @@
         </p:blipFill>
         <p:spPr>
           <a:xfrm>
-            <a:off x="1021296" y="1196752"/>
-            <a:ext cx="7173416" cy="5260504"/>
+            <a:off x="545999" y="710075"/>
+            <a:ext cx="7951037" cy="5830759"/>
           </a:xfrm>
           <a:prstGeom prst="rect">
             <a:avLst/>
           </a:prstGeom>
         </p:spPr>
       </p:pic>
+      <p:sp>
+        <p:nvSpPr>
+          <p:cNvPr id="2" name="Titre 1"/>
+          <p:cNvSpPr>
+            <a:spLocks noGrp="1"/>
+          </p:cNvSpPr>
+          <p:nvPr>
+            <p:ph type="title"/>
+          </p:nvPr>
+        </p:nvSpPr>
+        <p:spPr/>
+        <p:txBody>
+          <a:bodyPr/>
+          <a:lstStyle/>
+          <a:p>
+            <a:r>
+              <a:rPr lang="fr-FR" dirty="0" smtClean="0"/>
+              <a:t>Pixel </a:t>
+            </a:r>
+            <a:r>
+              <a:rPr lang="fr-FR" dirty="0" err="1" smtClean="0"/>
+              <a:t>Shader</a:t>
+            </a:r>
+            <a:endParaRPr lang="fr-FR" dirty="0"/>
+          </a:p>
+        </p:txBody>
+      </p:sp>
+      <p:sp>
+        <p:nvSpPr>
+          <p:cNvPr id="4" name="Espace réservé du pied de page 3"/>
+          <p:cNvSpPr>
+            <a:spLocks noGrp="1"/>
+          </p:cNvSpPr>
+          <p:nvPr>
+            <p:ph type="ftr" sz="quarter" idx="3"/>
+          </p:nvPr>
+        </p:nvSpPr>
+        <p:spPr/>
+        <p:txBody>
+          <a:bodyPr/>
+          <a:lstStyle/>
+          <a:p>
+            <a:r>
+              <a:rPr lang="fr-FR" b="1" dirty="0" smtClean="0"/>
+              <a:t>Rémi Ronfard - GMIN317 – GPU </a:t>
+            </a:r>
+            <a:endParaRPr lang="fr-FR" b="1" dirty="0"/>
+          </a:p>
+        </p:txBody>
+      </p:sp>
+      <p:sp>
+        <p:nvSpPr>
+          <p:cNvPr id="5" name="Espace réservé du numéro de diapositive 4"/>
+          <p:cNvSpPr>
+            <a:spLocks noGrp="1"/>
+          </p:cNvSpPr>
+          <p:nvPr>
+            <p:ph type="sldNum" sz="quarter" idx="4"/>
+          </p:nvPr>
+        </p:nvSpPr>
+        <p:spPr/>
+        <p:txBody>
+          <a:bodyPr/>
+          <a:lstStyle/>
+          <a:p>
+            <a:fld id="{A6C87E8C-A1B1-CC4A-8C89-9A370644B80A}" type="slidenum">
+              <a:rPr lang="fr-FR" smtClean="0"/>
+              <a:pPr/>
+              <a:t>34</a:t>
+            </a:fld>
+            <a:endParaRPr lang="fr-FR" dirty="0"/>
+          </a:p>
+        </p:txBody>
+      </p:sp>
+      <p:sp>
+        <p:nvSpPr>
+          <p:cNvPr id="6" name="Espace réservé de la date 5"/>
+          <p:cNvSpPr>
+            <a:spLocks noGrp="1"/>
+          </p:cNvSpPr>
+          <p:nvPr>
+            <p:ph type="dt" sz="half" idx="2"/>
+          </p:nvPr>
+        </p:nvSpPr>
+        <p:spPr/>
+        <p:txBody>
+          <a:bodyPr/>
+          <a:lstStyle/>
+          <a:p>
+            <a:fld id="{609FCB34-7A6F-D943-86A1-3B373F5C57D2}" type="datetime1">
+              <a:rPr lang="fr-FR" smtClean="0"/>
+              <a:t>18/09/15</a:t>
+            </a:fld>
+            <a:endParaRPr lang="fr-FR" dirty="0"/>
+          </a:p>
+        </p:txBody>
+      </p:sp>
     </p:spTree>
     <p:extLst>
       <p:ext uri="{BB962C8B-B14F-4D97-AF65-F5344CB8AC3E}">
@@ -11777,7 +11782,7 @@
           <a:p>
             <a:fld id="{0023EB83-37B3-1C48-A74C-688A97E73438}" type="datetime1">
               <a:rPr lang="fr-FR" smtClean="0"/>
-              <a:t>07/09/15</a:t>
+              <a:t>18/09/15</a:t>
             </a:fld>
             <a:endParaRPr lang="fr-FR" dirty="0"/>
           </a:p>
@@ -12159,7 +12164,7 @@
           <a:p>
             <a:fld id="{5B5E8C4A-CE10-864C-94E0-770A290129E7}" type="datetime1">
               <a:rPr lang="fr-FR" smtClean="0"/>
-              <a:t>07/09/15</a:t>
+              <a:t>18/09/15</a:t>
             </a:fld>
             <a:endParaRPr lang="fr-FR" dirty="0"/>
           </a:p>
@@ -12854,7 +12859,7 @@
           <a:p>
             <a:fld id="{3E57BF13-9C8B-B14D-B73A-CF961BFEF8B9}" type="datetime1">
               <a:rPr lang="fr-FR" smtClean="0"/>
-              <a:t>07/09/15</a:t>
+              <a:t>18/09/15</a:t>
             </a:fld>
             <a:endParaRPr lang="fr-FR" dirty="0"/>
           </a:p>
@@ -13046,7 +13051,7 @@
           <a:p>
             <a:fld id="{DA0DD4A1-F207-0346-A79E-38E6976906CD}" type="datetime1">
               <a:rPr lang="fr-FR" smtClean="0"/>
-              <a:t>07/09/15</a:t>
+              <a:t>18/09/15</a:t>
             </a:fld>
             <a:endParaRPr lang="fr-FR" dirty="0"/>
           </a:p>
@@ -13188,7 +13193,7 @@
           <a:p>
             <a:fld id="{6260FEA1-D69A-8E47-9B58-807E932EF703}" type="datetime1">
               <a:rPr lang="fr-FR" smtClean="0"/>
-              <a:t>07/09/15</a:t>
+              <a:t>18/09/15</a:t>
             </a:fld>
             <a:endParaRPr lang="fr-FR" dirty="0"/>
           </a:p>
@@ -13210,8 +13215,8 @@
         </p:blipFill>
         <p:spPr>
           <a:xfrm>
-            <a:off x="1442823" y="1641453"/>
-            <a:ext cx="6514304" cy="4548684"/>
+            <a:off x="1442822" y="1641453"/>
+            <a:ext cx="6782771" cy="4736144"/>
           </a:xfrm>
           <a:prstGeom prst="rect">
             <a:avLst/>
@@ -13313,15 +13318,7 @@
           <a:p>
             <a:r>
               <a:rPr lang="fr-FR" dirty="0" smtClean="0"/>
-              <a:t>Dans </a:t>
-            </a:r>
-            <a:r>
-              <a:rPr lang="fr-FR" dirty="0" smtClean="0"/>
-              <a:t>OpenGL, </a:t>
-            </a:r>
-            <a:r>
-              <a:rPr lang="fr-FR" dirty="0" smtClean="0"/>
-              <a:t>la longueur et la largeur d’une texture devait être une puissance de 2 ..</a:t>
+              <a:t>Dans OpenGL, la longueur et la largeur d’une texture devait être une puissance de 2 ..</a:t>
             </a:r>
           </a:p>
           <a:p>
@@ -13398,7 +13395,7 @@
           <a:p>
             <a:fld id="{B8C25D18-B530-1646-BBCC-D7061B7F5018}" type="datetime1">
               <a:rPr lang="fr-FR" smtClean="0"/>
-              <a:t>07/09/15</a:t>
+              <a:t>18/09/15</a:t>
             </a:fld>
             <a:endParaRPr lang="fr-FR" dirty="0"/>
           </a:p>
@@ -13455,6 +13452,38 @@
       </p:sp>
       <p:sp>
         <p:nvSpPr>
+          <p:cNvPr id="3" name="Espace réservé du contenu 2"/>
+          <p:cNvSpPr>
+            <a:spLocks noGrp="1"/>
+          </p:cNvSpPr>
+          <p:nvPr>
+            <p:ph idx="1"/>
+          </p:nvPr>
+        </p:nvSpPr>
+        <p:spPr/>
+        <p:txBody>
+          <a:bodyPr/>
+          <a:lstStyle/>
+          <a:p>
+            <a:r>
+              <a:rPr lang="fr-FR" dirty="0" smtClean="0"/>
+              <a:t>GPU vs CPU</a:t>
+            </a:r>
+          </a:p>
+          <a:p>
+            <a:pPr marL="0" indent="0">
+              <a:buNone/>
+            </a:pPr>
+            <a:r>
+              <a:rPr lang="fr-FR" dirty="0" smtClean="0"/>
+              <a:t>Plus de transistors sur un GPU dédié au calcul</a:t>
+            </a:r>
+            <a:endParaRPr lang="fr-FR" dirty="0"/>
+          </a:p>
+        </p:txBody>
+      </p:sp>
+      <p:sp>
+        <p:nvSpPr>
           <p:cNvPr id="4" name="Espace réservé du pied de page 3"/>
           <p:cNvSpPr>
             <a:spLocks noGrp="1"/>
@@ -13515,190 +13544,9 @@
           <a:bodyPr/>
           <a:lstStyle/>
           <a:p>
-            <a:fld id="{40B6A4BA-9C7B-D343-9F09-44DEA7445149}" type="datetime1">
-              <a:rPr lang="fr-FR" smtClean="0"/>
-              <a:t>07/09/15</a:t>
-            </a:fld>
-            <a:endParaRPr lang="fr-FR" dirty="0"/>
-          </a:p>
-        </p:txBody>
-      </p:sp>
-      <p:pic>
-        <p:nvPicPr>
-          <p:cNvPr id="7" name="Image 6" descr="Capture d’écran 2014-09-22 à 15.27.29.png"/>
-          <p:cNvPicPr>
-            <a:picLocks noChangeAspect="1"/>
-          </p:cNvPicPr>
-          <p:nvPr/>
-        </p:nvPicPr>
-        <p:blipFill>
-          <a:blip r:embed="rId2">
-            <a:extLst>
-              <a:ext uri="{28A0092B-C50C-407E-A947-70E740481C1C}">
-                <a14:useLocalDpi xmlns:a14="http://schemas.microsoft.com/office/drawing/2010/main" val="0"/>
-              </a:ext>
-            </a:extLst>
-          </a:blip>
-          <a:stretch>
-            <a:fillRect/>
-          </a:stretch>
-        </p:blipFill>
-        <p:spPr>
-          <a:xfrm>
-            <a:off x="1003057" y="717120"/>
-            <a:ext cx="6871584" cy="5803920"/>
-          </a:xfrm>
-          <a:prstGeom prst="rect">
-            <a:avLst/>
-          </a:prstGeom>
-        </p:spPr>
-      </p:pic>
-    </p:spTree>
-    <p:extLst>
-      <p:ext uri="{BB962C8B-B14F-4D97-AF65-F5344CB8AC3E}">
-        <p14:creationId xmlns:p14="http://schemas.microsoft.com/office/powerpoint/2010/main" val="3640302859"/>
-      </p:ext>
-    </p:extLst>
-  </p:cSld>
-  <p:clrMapOvr>
-    <a:masterClrMapping/>
-  </p:clrMapOvr>
-</p:sld>
-</file>
-
-<file path=ppt/slides/slide41.xml><?xml version="1.0" encoding="utf-8"?>
-<p:sld xmlns:a="http://schemas.openxmlformats.org/drawingml/2006/main" xmlns:r="http://schemas.openxmlformats.org/officeDocument/2006/relationships" xmlns:p="http://schemas.openxmlformats.org/presentationml/2006/main">
-  <p:cSld>
-    <p:spTree>
-      <p:nvGrpSpPr>
-        <p:cNvPr id="1" name=""/>
-        <p:cNvGrpSpPr/>
-        <p:nvPr/>
-      </p:nvGrpSpPr>
-      <p:grpSpPr>
-        <a:xfrm>
-          <a:off x="0" y="0"/>
-          <a:ext cx="0" cy="0"/>
-          <a:chOff x="0" y="0"/>
-          <a:chExt cx="0" cy="0"/>
-        </a:xfrm>
-      </p:grpSpPr>
-      <p:sp>
-        <p:nvSpPr>
-          <p:cNvPr id="2" name="Titre 1"/>
-          <p:cNvSpPr>
-            <a:spLocks noGrp="1"/>
-          </p:cNvSpPr>
-          <p:nvPr>
-            <p:ph type="title"/>
-          </p:nvPr>
-        </p:nvSpPr>
-        <p:spPr/>
-        <p:txBody>
-          <a:bodyPr/>
-          <a:lstStyle/>
-          <a:p>
-            <a:endParaRPr lang="fr-FR"/>
-          </a:p>
-        </p:txBody>
-      </p:sp>
-      <p:sp>
-        <p:nvSpPr>
-          <p:cNvPr id="3" name="Espace réservé du contenu 2"/>
-          <p:cNvSpPr>
-            <a:spLocks noGrp="1"/>
-          </p:cNvSpPr>
-          <p:nvPr>
-            <p:ph idx="1"/>
-          </p:nvPr>
-        </p:nvSpPr>
-        <p:spPr/>
-        <p:txBody>
-          <a:bodyPr/>
-          <a:lstStyle/>
-          <a:p>
-            <a:r>
-              <a:rPr lang="fr-FR" dirty="0" smtClean="0"/>
-              <a:t>GPU vs CPU</a:t>
-            </a:r>
-          </a:p>
-          <a:p>
-            <a:pPr marL="0" indent="0">
-              <a:buNone/>
-            </a:pPr>
-            <a:r>
-              <a:rPr lang="fr-FR" dirty="0" smtClean="0"/>
-              <a:t>Plus de transistors sur un GPU dédié au calcul</a:t>
-            </a:r>
-            <a:endParaRPr lang="fr-FR" dirty="0"/>
-          </a:p>
-        </p:txBody>
-      </p:sp>
-      <p:sp>
-        <p:nvSpPr>
-          <p:cNvPr id="4" name="Espace réservé du pied de page 3"/>
-          <p:cNvSpPr>
-            <a:spLocks noGrp="1"/>
-          </p:cNvSpPr>
-          <p:nvPr>
-            <p:ph type="ftr" sz="quarter" idx="3"/>
-          </p:nvPr>
-        </p:nvSpPr>
-        <p:spPr/>
-        <p:txBody>
-          <a:bodyPr/>
-          <a:lstStyle/>
-          <a:p>
-            <a:r>
-              <a:rPr lang="fr-FR" b="1" dirty="0" smtClean="0"/>
-              <a:t>Rémi Ronfard - GMIN317 – GPU </a:t>
-            </a:r>
-            <a:endParaRPr lang="fr-FR" b="1" dirty="0"/>
-          </a:p>
-        </p:txBody>
-      </p:sp>
-      <p:sp>
-        <p:nvSpPr>
-          <p:cNvPr id="5" name="Espace réservé du numéro de diapositive 4"/>
-          <p:cNvSpPr>
-            <a:spLocks noGrp="1"/>
-          </p:cNvSpPr>
-          <p:nvPr>
-            <p:ph type="sldNum" sz="quarter" idx="4"/>
-          </p:nvPr>
-        </p:nvSpPr>
-        <p:spPr/>
-        <p:txBody>
-          <a:bodyPr/>
-          <a:lstStyle/>
-          <a:p>
-            <a:fld id="{A6C87E8C-A1B1-CC4A-8C89-9A370644B80A}" type="slidenum">
-              <a:rPr lang="fr-FR" smtClean="0"/>
-              <a:pPr/>
-              <a:t>41</a:t>
-            </a:fld>
-            <a:endParaRPr lang="fr-FR" dirty="0"/>
-          </a:p>
-        </p:txBody>
-      </p:sp>
-      <p:sp>
-        <p:nvSpPr>
-          <p:cNvPr id="6" name="Espace réservé de la date 5"/>
-          <p:cNvSpPr>
-            <a:spLocks noGrp="1"/>
-          </p:cNvSpPr>
-          <p:nvPr>
-            <p:ph type="dt" sz="half" idx="2"/>
-          </p:nvPr>
-        </p:nvSpPr>
-        <p:spPr/>
-        <p:txBody>
-          <a:bodyPr/>
-          <a:lstStyle/>
-          <a:p>
             <a:fld id="{B1201D45-EDB7-D44C-B89B-B9204DFC19EC}" type="datetime1">
               <a:rPr lang="fr-FR" smtClean="0"/>
-              <a:t>07/09/15</a:t>
+              <a:t>18/09/15</a:t>
             </a:fld>
             <a:endParaRPr lang="fr-FR" dirty="0"/>
           </a:p>
@@ -13741,6 +13589,365 @@
 </p:sld>
 </file>
 
+<file path=ppt/slides/slide41.xml><?xml version="1.0" encoding="utf-8"?>
+<p:sld xmlns:a="http://schemas.openxmlformats.org/drawingml/2006/main" xmlns:r="http://schemas.openxmlformats.org/officeDocument/2006/relationships" xmlns:p="http://schemas.openxmlformats.org/presentationml/2006/main">
+  <p:cSld>
+    <p:spTree>
+      <p:nvGrpSpPr>
+        <p:cNvPr id="1" name=""/>
+        <p:cNvGrpSpPr/>
+        <p:nvPr/>
+      </p:nvGrpSpPr>
+      <p:grpSpPr>
+        <a:xfrm>
+          <a:off x="0" y="0"/>
+          <a:ext cx="0" cy="0"/>
+          <a:chOff x="0" y="0"/>
+          <a:chExt cx="0" cy="0"/>
+        </a:xfrm>
+      </p:grpSpPr>
+      <p:sp>
+        <p:nvSpPr>
+          <p:cNvPr id="2" name="Titre 1"/>
+          <p:cNvSpPr>
+            <a:spLocks noGrp="1"/>
+          </p:cNvSpPr>
+          <p:nvPr>
+            <p:ph type="title"/>
+          </p:nvPr>
+        </p:nvSpPr>
+        <p:spPr/>
+        <p:txBody>
+          <a:bodyPr/>
+          <a:lstStyle/>
+          <a:p>
+            <a:endParaRPr lang="fr-FR"/>
+          </a:p>
+        </p:txBody>
+      </p:sp>
+      <p:sp>
+        <p:nvSpPr>
+          <p:cNvPr id="3" name="Espace réservé du contenu 2"/>
+          <p:cNvSpPr>
+            <a:spLocks noGrp="1"/>
+          </p:cNvSpPr>
+          <p:nvPr>
+            <p:ph idx="1"/>
+          </p:nvPr>
+        </p:nvSpPr>
+        <p:spPr>
+          <a:xfrm>
+            <a:off x="457200" y="1096412"/>
+            <a:ext cx="4104540" cy="5029751"/>
+          </a:xfrm>
+        </p:spPr>
+        <p:txBody>
+          <a:bodyPr>
+            <a:normAutofit fontScale="55000" lnSpcReduction="20000"/>
+          </a:bodyPr>
+          <a:lstStyle/>
+          <a:p>
+            <a:pPr algn="just"/>
+            <a:r>
+              <a:rPr lang="fr-FR" dirty="0"/>
+              <a:t>Au sommet </a:t>
+            </a:r>
+            <a:r>
+              <a:rPr lang="fr-FR" i="1" dirty="0"/>
+              <a:t>application</a:t>
+            </a:r>
+            <a:r>
+              <a:rPr lang="fr-FR" dirty="0"/>
+              <a:t>, le code source du programme appelant (C, Java, Python, etc.) </a:t>
+            </a:r>
+            <a:r>
+              <a:rPr lang="fr-FR" dirty="0" smtClean="0"/>
+              <a:t>exécuté </a:t>
+            </a:r>
+            <a:r>
+              <a:rPr lang="fr-FR" dirty="0"/>
+              <a:t>par le CPU	</a:t>
+            </a:r>
+            <a:endParaRPr lang="fr-FR" dirty="0" smtClean="0"/>
+          </a:p>
+          <a:p>
+            <a:pPr algn="just"/>
+            <a:endParaRPr lang="fr-FR" dirty="0"/>
+          </a:p>
+          <a:p>
+            <a:pPr algn="just"/>
+            <a:r>
+              <a:rPr lang="fr-FR" dirty="0"/>
+              <a:t>En dessous, le </a:t>
+            </a:r>
+            <a:r>
+              <a:rPr lang="fr-FR" i="1" dirty="0" err="1"/>
+              <a:t>framework</a:t>
+            </a:r>
+            <a:r>
+              <a:rPr lang="fr-FR" dirty="0"/>
+              <a:t> comprenant l'API (fonctions utilisables par le code source appelant) et le langage </a:t>
+            </a:r>
+            <a:r>
+              <a:rPr lang="fr-FR" dirty="0" err="1"/>
+              <a:t>OpenCL</a:t>
+            </a:r>
+            <a:r>
+              <a:rPr lang="fr-FR" dirty="0"/>
+              <a:t> permettant de développer des programmes </a:t>
+            </a:r>
+            <a:r>
+              <a:rPr lang="fr-FR" dirty="0" smtClean="0"/>
+              <a:t>exécutables </a:t>
+            </a:r>
+            <a:r>
+              <a:rPr lang="fr-FR" dirty="0"/>
+              <a:t>par le GPU</a:t>
+            </a:r>
+            <a:r>
+              <a:rPr lang="fr-FR" dirty="0" smtClean="0"/>
+              <a:t>.</a:t>
+            </a:r>
+          </a:p>
+          <a:p>
+            <a:pPr algn="just"/>
+            <a:endParaRPr lang="fr-FR" dirty="0"/>
+          </a:p>
+          <a:p>
+            <a:pPr algn="just"/>
+            <a:r>
+              <a:rPr lang="fr-FR" dirty="0"/>
+              <a:t>Après ce trouve le </a:t>
+            </a:r>
+            <a:r>
+              <a:rPr lang="fr-FR" i="1" dirty="0" err="1"/>
+              <a:t>runtime</a:t>
+            </a:r>
+            <a:r>
+              <a:rPr lang="fr-FR" dirty="0"/>
+              <a:t>, c'est-à-dire l'implémentation permettant </a:t>
+            </a:r>
+            <a:r>
+              <a:rPr lang="fr-FR" dirty="0" smtClean="0"/>
+              <a:t>d'exécuter </a:t>
+            </a:r>
+            <a:r>
+              <a:rPr lang="fr-FR" dirty="0"/>
+              <a:t>le code </a:t>
+            </a:r>
+            <a:r>
+              <a:rPr lang="fr-FR" dirty="0" err="1"/>
+              <a:t>OpenCL</a:t>
+            </a:r>
+            <a:r>
+              <a:rPr lang="fr-FR" dirty="0"/>
+              <a:t>.	</a:t>
+            </a:r>
+          </a:p>
+          <a:p>
+            <a:pPr algn="just"/>
+            <a:endParaRPr lang="fr-FR" dirty="0" smtClean="0"/>
+          </a:p>
+          <a:p>
+            <a:pPr algn="just"/>
+            <a:r>
+              <a:rPr lang="fr-FR" dirty="0"/>
+              <a:t>Ensuite le </a:t>
+            </a:r>
+            <a:r>
+              <a:rPr lang="fr-FR" i="1" dirty="0"/>
+              <a:t>driver</a:t>
+            </a:r>
+            <a:r>
+              <a:rPr lang="fr-FR" dirty="0"/>
+              <a:t>, le pilote permettant de communiquer avec le GPU	</a:t>
+            </a:r>
+          </a:p>
+          <a:p>
+            <a:pPr algn="just"/>
+            <a:endParaRPr lang="fr-FR" dirty="0" smtClean="0"/>
+          </a:p>
+          <a:p>
+            <a:pPr algn="just"/>
+            <a:r>
+              <a:rPr lang="fr-FR" dirty="0"/>
+              <a:t>En dernier se trouve le périphérique GPU (la carte graphique).</a:t>
+            </a:r>
+          </a:p>
+        </p:txBody>
+      </p:sp>
+      <p:sp>
+        <p:nvSpPr>
+          <p:cNvPr id="4" name="Espace réservé du pied de page 3"/>
+          <p:cNvSpPr>
+            <a:spLocks noGrp="1"/>
+          </p:cNvSpPr>
+          <p:nvPr>
+            <p:ph type="ftr" sz="quarter" idx="3"/>
+          </p:nvPr>
+        </p:nvSpPr>
+        <p:spPr/>
+        <p:txBody>
+          <a:bodyPr/>
+          <a:lstStyle/>
+          <a:p>
+            <a:r>
+              <a:rPr lang="fr-FR" b="1" dirty="0" smtClean="0"/>
+              <a:t>Rémi Ronfard - GMIN317 – GPU </a:t>
+            </a:r>
+            <a:endParaRPr lang="fr-FR" b="1" dirty="0"/>
+          </a:p>
+        </p:txBody>
+      </p:sp>
+      <p:sp>
+        <p:nvSpPr>
+          <p:cNvPr id="5" name="Espace réservé du numéro de diapositive 4"/>
+          <p:cNvSpPr>
+            <a:spLocks noGrp="1"/>
+          </p:cNvSpPr>
+          <p:nvPr>
+            <p:ph type="sldNum" sz="quarter" idx="4"/>
+          </p:nvPr>
+        </p:nvSpPr>
+        <p:spPr/>
+        <p:txBody>
+          <a:bodyPr/>
+          <a:lstStyle/>
+          <a:p>
+            <a:fld id="{A6C87E8C-A1B1-CC4A-8C89-9A370644B80A}" type="slidenum">
+              <a:rPr lang="fr-FR" smtClean="0"/>
+              <a:pPr/>
+              <a:t>41</a:t>
+            </a:fld>
+            <a:endParaRPr lang="fr-FR" dirty="0"/>
+          </a:p>
+        </p:txBody>
+      </p:sp>
+      <p:sp>
+        <p:nvSpPr>
+          <p:cNvPr id="6" name="Espace réservé de la date 5"/>
+          <p:cNvSpPr>
+            <a:spLocks noGrp="1"/>
+          </p:cNvSpPr>
+          <p:nvPr>
+            <p:ph type="dt" sz="half" idx="2"/>
+          </p:nvPr>
+        </p:nvSpPr>
+        <p:spPr/>
+        <p:txBody>
+          <a:bodyPr/>
+          <a:lstStyle/>
+          <a:p>
+            <a:fld id="{FA4012C4-FFAC-5345-A195-E6D68582D190}" type="datetime1">
+              <a:rPr lang="fr-FR" smtClean="0"/>
+              <a:t>18/09/15</a:t>
+            </a:fld>
+            <a:endParaRPr lang="fr-FR" dirty="0"/>
+          </a:p>
+        </p:txBody>
+      </p:sp>
+      <p:pic>
+        <p:nvPicPr>
+          <p:cNvPr id="9" name="Image 8"/>
+          <p:cNvPicPr>
+            <a:picLocks noChangeAspect="1"/>
+          </p:cNvPicPr>
+          <p:nvPr/>
+        </p:nvPicPr>
+        <p:blipFill>
+          <a:blip r:embed="rId2"/>
+          <a:stretch>
+            <a:fillRect/>
+          </a:stretch>
+        </p:blipFill>
+        <p:spPr>
+          <a:xfrm>
+            <a:off x="4860772" y="909198"/>
+            <a:ext cx="4229468" cy="5216965"/>
+          </a:xfrm>
+          <a:prstGeom prst="rect">
+            <a:avLst/>
+          </a:prstGeom>
+        </p:spPr>
+      </p:pic>
+      <p:sp>
+        <p:nvSpPr>
+          <p:cNvPr id="10" name="Rectangle 9"/>
+          <p:cNvSpPr/>
+          <p:nvPr/>
+        </p:nvSpPr>
+        <p:spPr>
+          <a:xfrm>
+            <a:off x="126084" y="6166503"/>
+            <a:ext cx="9017915" cy="307777"/>
+          </a:xfrm>
+          <a:prstGeom prst="rect">
+            <a:avLst/>
+          </a:prstGeom>
+        </p:spPr>
+        <p:txBody>
+          <a:bodyPr wrap="square">
+            <a:spAutoFit/>
+          </a:bodyPr>
+          <a:lstStyle/>
+          <a:p>
+            <a:r>
+              <a:rPr lang="fr-FR" sz="1400" dirty="0"/>
+              <a:t>http://www-</a:t>
+            </a:r>
+            <a:r>
+              <a:rPr lang="fr-FR" sz="1400" dirty="0" err="1"/>
+              <a:t>igm.univ</a:t>
+            </a:r>
+            <a:r>
+              <a:rPr lang="fr-FR" sz="1400" dirty="0"/>
+              <a:t>-</a:t>
+            </a:r>
+            <a:r>
+              <a:rPr lang="fr-FR" sz="1400" dirty="0" err="1"/>
+              <a:t>mlv.fr</a:t>
+            </a:r>
+            <a:r>
+              <a:rPr lang="fr-FR" sz="1400" dirty="0"/>
+              <a:t>/~</a:t>
+            </a:r>
+            <a:r>
+              <a:rPr lang="fr-FR" sz="1400" dirty="0" err="1"/>
+              <a:t>dr</a:t>
+            </a:r>
+            <a:r>
+              <a:rPr lang="fr-FR" sz="1400" dirty="0"/>
+              <a:t>/XPOSE2011/</a:t>
+            </a:r>
+            <a:r>
+              <a:rPr lang="fr-FR" sz="1400" dirty="0" err="1"/>
+              <a:t>openclgpucomputing</a:t>
+            </a:r>
+            <a:r>
+              <a:rPr lang="fr-FR" sz="1400" dirty="0"/>
+              <a:t>/</a:t>
+            </a:r>
+            <a:r>
+              <a:rPr lang="fr-FR" sz="1400" dirty="0" err="1"/>
+              <a:t>comment_programmer.php</a:t>
+            </a:r>
+            <a:endParaRPr lang="fr-FR" sz="1400" dirty="0"/>
+          </a:p>
+        </p:txBody>
+      </p:sp>
+    </p:spTree>
+    <p:extLst>
+      <p:ext uri="{BB962C8B-B14F-4D97-AF65-F5344CB8AC3E}">
+        <p14:creationId xmlns:p14="http://schemas.microsoft.com/office/powerpoint/2010/main" val="3615640945"/>
+      </p:ext>
+    </p:extLst>
+  </p:cSld>
+  <p:clrMapOvr>
+    <a:masterClrMapping/>
+  </p:clrMapOvr>
+</p:sld>
+</file>
+
 <file path=ppt/slides/slide42.xml><?xml version="1.0" encoding="utf-8"?>
 <p:sld xmlns:a="http://schemas.openxmlformats.org/drawingml/2006/main" xmlns:r="http://schemas.openxmlformats.org/officeDocument/2006/relationships" xmlns:p="http://schemas.openxmlformats.org/presentationml/2006/main">
   <p:cSld>
@@ -13779,6 +13986,191 @@
       </p:sp>
       <p:sp>
         <p:nvSpPr>
+          <p:cNvPr id="3" name="Espace réservé du contenu 2"/>
+          <p:cNvSpPr>
+            <a:spLocks noGrp="1"/>
+          </p:cNvSpPr>
+          <p:nvPr>
+            <p:ph idx="1"/>
+          </p:nvPr>
+        </p:nvSpPr>
+        <p:spPr/>
+        <p:txBody>
+          <a:bodyPr>
+            <a:normAutofit fontScale="77500" lnSpcReduction="20000"/>
+          </a:bodyPr>
+          <a:lstStyle/>
+          <a:p>
+            <a:pPr marL="0" indent="0">
+              <a:buNone/>
+            </a:pPr>
+            <a:r>
+              <a:rPr lang="fr-FR" dirty="0" smtClean="0"/>
+              <a:t>Principe d’</a:t>
+            </a:r>
+            <a:r>
+              <a:rPr lang="fr-FR" dirty="0" err="1" smtClean="0"/>
+              <a:t>OpenCL</a:t>
+            </a:r>
+            <a:r>
+              <a:rPr lang="fr-FR" dirty="0" smtClean="0"/>
+              <a:t>:</a:t>
+            </a:r>
+          </a:p>
+          <a:p>
+            <a:pPr marL="971550" lvl="1" indent="-514350">
+              <a:buFont typeface="+mj-lt"/>
+              <a:buAutoNum type="arabicPeriod"/>
+            </a:pPr>
+            <a:r>
+              <a:rPr lang="fr-FR" dirty="0" smtClean="0"/>
+              <a:t>Obtenir le contexte</a:t>
+            </a:r>
+          </a:p>
+          <a:p>
+            <a:pPr marL="971550" lvl="1" indent="-514350">
+              <a:buFont typeface="+mj-lt"/>
+              <a:buAutoNum type="arabicPeriod"/>
+            </a:pPr>
+            <a:r>
+              <a:rPr lang="fr-FR" dirty="0" smtClean="0"/>
+              <a:t>Récupérer l’id de l’accélérateur</a:t>
+            </a:r>
+          </a:p>
+          <a:p>
+            <a:pPr marL="971550" lvl="1" indent="-514350">
+              <a:buFont typeface="+mj-lt"/>
+              <a:buAutoNum type="arabicPeriod"/>
+            </a:pPr>
+            <a:r>
+              <a:rPr lang="fr-FR" dirty="0" smtClean="0"/>
+              <a:t>Créer le contexte pour le matériel</a:t>
+            </a:r>
+          </a:p>
+          <a:p>
+            <a:pPr marL="971550" lvl="1" indent="-514350">
+              <a:buFont typeface="+mj-lt"/>
+              <a:buAutoNum type="arabicPeriod"/>
+            </a:pPr>
+            <a:r>
+              <a:rPr lang="fr-FR" dirty="0" smtClean="0"/>
+              <a:t>Créer le programme à partir du code source</a:t>
+            </a:r>
+          </a:p>
+          <a:p>
+            <a:pPr marL="971550" lvl="1" indent="-514350">
+              <a:buFont typeface="+mj-lt"/>
+              <a:buAutoNum type="arabicPeriod"/>
+            </a:pPr>
+            <a:r>
+              <a:rPr lang="fr-FR" dirty="0" err="1" smtClean="0"/>
+              <a:t>Build</a:t>
+            </a:r>
+            <a:r>
+              <a:rPr lang="fr-FR" dirty="0" smtClean="0"/>
+              <a:t> du programme</a:t>
+            </a:r>
+          </a:p>
+          <a:p>
+            <a:pPr marL="971550" lvl="1" indent="-514350">
+              <a:buFont typeface="+mj-lt"/>
+              <a:buAutoNum type="arabicPeriod"/>
+            </a:pPr>
+            <a:r>
+              <a:rPr lang="fr-FR" dirty="0" smtClean="0"/>
+              <a:t>Création des </a:t>
+            </a:r>
+            <a:r>
+              <a:rPr lang="fr-FR" dirty="0" err="1" smtClean="0"/>
+              <a:t>kernels</a:t>
+            </a:r>
+            <a:endParaRPr lang="fr-FR" dirty="0" smtClean="0"/>
+          </a:p>
+          <a:p>
+            <a:pPr marL="971550" lvl="1" indent="-514350">
+              <a:buFont typeface="+mj-lt"/>
+              <a:buAutoNum type="arabicPeriod"/>
+            </a:pPr>
+            <a:r>
+              <a:rPr lang="fr-FR" dirty="0" smtClean="0"/>
+              <a:t>Création de la queue de commande pour le matériel</a:t>
+            </a:r>
+          </a:p>
+          <a:p>
+            <a:pPr marL="971550" lvl="1" indent="-514350">
+              <a:buFont typeface="+mj-lt"/>
+              <a:buAutoNum type="arabicPeriod"/>
+            </a:pPr>
+            <a:r>
+              <a:rPr lang="fr-FR" dirty="0" smtClean="0"/>
+              <a:t>Allocation de la mémoire/ déplacement des données</a:t>
+            </a:r>
+          </a:p>
+          <a:p>
+            <a:pPr marL="971550" lvl="1" indent="-514350">
+              <a:buFont typeface="+mj-lt"/>
+              <a:buAutoNum type="arabicPeriod"/>
+            </a:pPr>
+            <a:r>
+              <a:rPr lang="fr-FR" dirty="0" smtClean="0"/>
+              <a:t>Association des arguments aux </a:t>
+            </a:r>
+            <a:r>
+              <a:rPr lang="fr-FR" dirty="0" err="1" smtClean="0"/>
+              <a:t>kernels</a:t>
+            </a:r>
+            <a:endParaRPr lang="fr-FR" dirty="0" smtClean="0"/>
+          </a:p>
+          <a:p>
+            <a:pPr marL="971550" lvl="1" indent="-514350">
+              <a:buFont typeface="+mj-lt"/>
+              <a:buAutoNum type="arabicPeriod"/>
+            </a:pPr>
+            <a:r>
+              <a:rPr lang="fr-FR" dirty="0" smtClean="0"/>
+              <a:t>Déploiement des </a:t>
+            </a:r>
+            <a:r>
+              <a:rPr lang="fr-FR" dirty="0" err="1" smtClean="0"/>
+              <a:t>kernels</a:t>
+            </a:r>
+            <a:r>
+              <a:rPr lang="fr-FR" dirty="0" smtClean="0"/>
+              <a:t> pour l’exécution</a:t>
+            </a:r>
+          </a:p>
+          <a:p>
+            <a:pPr marL="971550" lvl="1" indent="-514350">
+              <a:buFont typeface="+mj-lt"/>
+              <a:buAutoNum type="arabicPeriod"/>
+            </a:pPr>
+            <a:r>
+              <a:rPr lang="fr-FR" dirty="0" smtClean="0"/>
+              <a:t>Déplacement des résultats vers la mémoire hôte</a:t>
+            </a:r>
+          </a:p>
+          <a:p>
+            <a:pPr marL="971550" lvl="1" indent="-514350">
+              <a:buFont typeface="+mj-lt"/>
+              <a:buAutoNum type="arabicPeriod"/>
+            </a:pPr>
+            <a:r>
+              <a:rPr lang="fr-FR" dirty="0" smtClean="0"/>
+              <a:t>Relâchement du contexte, programme, </a:t>
+            </a:r>
+            <a:r>
+              <a:rPr lang="fr-FR" dirty="0" err="1" smtClean="0"/>
+              <a:t>kernel</a:t>
+            </a:r>
+            <a:r>
+              <a:rPr lang="fr-FR" dirty="0" smtClean="0"/>
+              <a:t> et mémoire.</a:t>
+            </a:r>
+          </a:p>
+        </p:txBody>
+      </p:sp>
+      <p:sp>
+        <p:nvSpPr>
           <p:cNvPr id="4" name="Espace réservé du pied de page 3"/>
           <p:cNvSpPr>
             <a:spLocks noGrp="1"/>
@@ -13839,59 +14231,10 @@
           <a:bodyPr/>
           <a:lstStyle/>
           <a:p>
-            <a:fld id="{21E9BC87-3970-CF47-8B3E-783890B57BC6}" type="datetime1">
+            <a:fld id="{233CE4CD-57CA-1E4C-B208-688E965A27A9}" type="datetime1">
               <a:rPr lang="fr-FR" smtClean="0"/>
-              <a:t>07/09/15</a:t>
+              <a:t>18/09/15</a:t>
             </a:fld>
-            <a:endParaRPr lang="fr-FR" dirty="0"/>
-          </a:p>
-        </p:txBody>
-      </p:sp>
-      <p:pic>
-        <p:nvPicPr>
-          <p:cNvPr id="8" name="Espace réservé du contenu 7"/>
-          <p:cNvPicPr>
-            <a:picLocks noGrp="1" noChangeAspect="1"/>
-          </p:cNvPicPr>
-          <p:nvPr>
-            <p:ph idx="1"/>
-          </p:nvPr>
-        </p:nvPicPr>
-        <p:blipFill>
-          <a:blip r:embed="rId2"/>
-          <a:srcRect l="3964" r="3964"/>
-          <a:stretch>
-            <a:fillRect/>
-          </a:stretch>
-        </p:blipFill>
-        <p:spPr/>
-      </p:pic>
-      <p:sp>
-        <p:nvSpPr>
-          <p:cNvPr id="9" name="ZoneTexte 8"/>
-          <p:cNvSpPr txBox="1"/>
-          <p:nvPr/>
-        </p:nvSpPr>
-        <p:spPr>
-          <a:xfrm>
-            <a:off x="319667" y="911746"/>
-            <a:ext cx="1492679" cy="369332"/>
-          </a:xfrm>
-          <a:prstGeom prst="rect">
-            <a:avLst/>
-          </a:prstGeom>
-          <a:noFill/>
-        </p:spPr>
-        <p:txBody>
-          <a:bodyPr wrap="none" rtlCol="0">
-            <a:spAutoFit/>
-          </a:bodyPr>
-          <a:lstStyle/>
-          <a:p>
-            <a:r>
-              <a:rPr lang="fr-FR" dirty="0" smtClean="0"/>
-              <a:t>Arrivé de APU</a:t>
-            </a:r>
             <a:endParaRPr lang="fr-FR" dirty="0"/>
           </a:p>
         </p:txBody>
@@ -13899,7 +14242,7 @@
     </p:spTree>
     <p:extLst>
       <p:ext uri="{BB962C8B-B14F-4D97-AF65-F5344CB8AC3E}">
-        <p14:creationId xmlns:p14="http://schemas.microsoft.com/office/powerpoint/2010/main" val="1398575275"/>
+        <p14:creationId xmlns:p14="http://schemas.microsoft.com/office/powerpoint/2010/main" val="758336139"/>
       </p:ext>
     </p:extLst>
   </p:cSld>
@@ -13955,144 +14298,121 @@
             <p:ph idx="1"/>
           </p:nvPr>
         </p:nvSpPr>
-        <p:spPr>
-          <a:xfrm>
-            <a:off x="457200" y="1096412"/>
-            <a:ext cx="4104540" cy="5029751"/>
-          </a:xfrm>
-        </p:spPr>
-        <p:txBody>
-          <a:bodyPr>
-            <a:normAutofit fontScale="55000" lnSpcReduction="20000"/>
-          </a:bodyPr>
-          <a:lstStyle/>
-          <a:p>
-            <a:pPr algn="just"/>
-            <a:r>
-              <a:rPr lang="fr-FR" dirty="0"/>
-              <a:t>Au sommet </a:t>
-            </a:r>
-            <a:r>
-              <a:rPr lang="fr-FR" i="1" dirty="0"/>
-              <a:t>application</a:t>
-            </a:r>
-            <a:r>
-              <a:rPr lang="fr-FR" dirty="0"/>
-              <a:t>, le code source du programme appelant (C, Java, Python, etc.) </a:t>
-            </a:r>
-            <a:r>
-              <a:rPr lang="fr-FR" dirty="0" smtClean="0"/>
-              <a:t>exécuté </a:t>
-            </a:r>
-            <a:r>
-              <a:rPr lang="fr-FR" dirty="0"/>
-              <a:t>par le CPU	</a:t>
+        <p:spPr/>
+        <p:txBody>
+          <a:bodyPr/>
+          <a:lstStyle/>
+          <a:p>
+            <a:pPr marL="514350" lvl="1" indent="-514350">
+              <a:buFont typeface="Arial"/>
+              <a:buChar char="•"/>
+            </a:pPr>
+            <a:r>
+              <a:rPr lang="fr-FR" dirty="0"/>
+              <a:t>Obtenir le contexte</a:t>
+            </a:r>
+          </a:p>
+          <a:p>
+            <a:pPr marL="742950" lvl="2" indent="-342900"/>
+            <a:r>
+              <a:rPr lang="fr-FR" dirty="0" smtClean="0"/>
+              <a:t>Méthode:</a:t>
+            </a:r>
+          </a:p>
+          <a:p>
+            <a:pPr marL="1200150" lvl="3" indent="-342900"/>
+            <a:r>
+              <a:rPr lang="fr-FR" dirty="0" err="1" smtClean="0"/>
+              <a:t>clGetPlatformIDs</a:t>
+            </a:r>
+            <a:r>
+              <a:rPr lang="fr-FR" dirty="0"/>
+              <a:t>(1, &amp;</a:t>
+            </a:r>
+            <a:r>
+              <a:rPr lang="fr-FR" dirty="0" err="1"/>
+              <a:t>platform</a:t>
+            </a:r>
+            <a:r>
+              <a:rPr lang="fr-FR" dirty="0"/>
+              <a:t>, NULL); </a:t>
             </a:r>
             <a:endParaRPr lang="fr-FR" dirty="0" smtClean="0"/>
           </a:p>
           <a:p>
-            <a:pPr algn="just"/>
-            <a:endParaRPr lang="fr-FR" dirty="0"/>
-          </a:p>
-          <a:p>
-            <a:pPr algn="just"/>
-            <a:r>
-              <a:rPr lang="fr-FR" dirty="0"/>
-              <a:t>En dessous, le </a:t>
-            </a:r>
-            <a:r>
-              <a:rPr lang="fr-FR" i="1" dirty="0" err="1"/>
-              <a:t>framework</a:t>
-            </a:r>
-            <a:r>
-              <a:rPr lang="fr-FR" dirty="0"/>
-              <a:t> comprenant l'API (fonctions utilisables par le code source appelant) et le langage </a:t>
-            </a:r>
+            <a:pPr marL="742950" lvl="2" indent="-342900"/>
+            <a:r>
+              <a:rPr lang="fr-FR" dirty="0" smtClean="0"/>
+              <a:t>Utilisé deux fois pour récupérer le nombre de dispositif</a:t>
+            </a:r>
+          </a:p>
+          <a:p>
+            <a:pPr marL="742950" lvl="2" indent="-342900"/>
+            <a:endParaRPr lang="fr-FR" dirty="0"/>
+          </a:p>
+          <a:p>
+            <a:pPr marL="457200" lvl="1" indent="-457200">
+              <a:buFont typeface="Arial"/>
+              <a:buChar char="•"/>
+            </a:pPr>
+            <a:r>
+              <a:rPr lang="fr-FR" dirty="0"/>
+              <a:t>Récupérer l’id de </a:t>
+            </a:r>
+            <a:r>
+              <a:rPr lang="fr-FR" dirty="0" smtClean="0"/>
+              <a:t>l’accélérateur</a:t>
+            </a:r>
+          </a:p>
+          <a:p>
+            <a:pPr marL="742950" lvl="2" indent="-342900"/>
+            <a:r>
+              <a:rPr lang="fr-FR" dirty="0" smtClean="0"/>
+              <a:t>Méthode:</a:t>
+            </a:r>
+          </a:p>
+          <a:p>
+            <a:pPr marL="1200150" lvl="3" indent="-342900"/>
             <a:r>
               <a:rPr lang="fr-FR" dirty="0" err="1"/>
-              <a:t>OpenCL</a:t>
-            </a:r>
-            <a:r>
-              <a:rPr lang="fr-FR" dirty="0"/>
-              <a:t> permettant de développer des programmes </a:t>
-            </a:r>
-            <a:r>
-              <a:rPr lang="fr-FR" dirty="0" smtClean="0"/>
-              <a:t>exécutables </a:t>
-            </a:r>
-            <a:r>
-              <a:rPr lang="fr-FR" dirty="0"/>
-              <a:t>par le GPU</a:t>
-            </a:r>
-            <a:r>
-              <a:rPr lang="fr-FR" dirty="0" smtClean="0"/>
-              <a:t>.</a:t>
-            </a:r>
-          </a:p>
-          <a:p>
-            <a:pPr algn="just"/>
-            <a:endParaRPr lang="fr-FR" dirty="0"/>
-          </a:p>
-          <a:p>
-            <a:pPr algn="just"/>
-            <a:r>
-              <a:rPr lang="fr-FR" dirty="0"/>
-              <a:t>Après ce trouve le </a:t>
-            </a:r>
-            <a:r>
-              <a:rPr lang="fr-FR" i="1" dirty="0" err="1"/>
-              <a:t>runtime</a:t>
-            </a:r>
-            <a:r>
-              <a:rPr lang="fr-FR" dirty="0"/>
-              <a:t>, c'est-à-dire l'implémentation permettant </a:t>
-            </a:r>
-            <a:r>
-              <a:rPr lang="fr-FR" dirty="0" smtClean="0"/>
-              <a:t>d'exécuter </a:t>
-            </a:r>
-            <a:r>
-              <a:rPr lang="fr-FR" dirty="0"/>
-              <a:t>le code </a:t>
+              <a:t>clGetDeviceIds</a:t>
+            </a:r>
+            <a:r>
+              <a:rPr lang="fr-FR" dirty="0"/>
+              <a:t>(</a:t>
             </a:r>
             <a:r>
               <a:rPr lang="fr-FR" dirty="0" err="1"/>
-              <a:t>OpenCL</a:t>
-            </a:r>
-            <a:r>
-              <a:rPr lang="fr-FR" dirty="0"/>
-              <a:t>.	</a:t>
-            </a:r>
-          </a:p>
-          <a:p>
-            <a:pPr algn="just"/>
+              <a:t>platform</a:t>
+            </a:r>
+            <a:r>
+              <a:rPr lang="fr-FR" dirty="0"/>
+              <a:t>, CL_DEVICE_TYPE_GPU, 1, &amp;</a:t>
+            </a:r>
+            <a:r>
+              <a:rPr lang="fr-FR" dirty="0" err="1"/>
+              <a:t>device</a:t>
+            </a:r>
+            <a:r>
+              <a:rPr lang="fr-FR" dirty="0"/>
+              <a:t>, NULL); </a:t>
+            </a:r>
+          </a:p>
+          <a:p>
+            <a:pPr marL="1200150" lvl="3" indent="-342900"/>
             <a:endParaRPr lang="fr-FR" dirty="0" smtClean="0"/>
           </a:p>
           <a:p>
-            <a:pPr algn="just"/>
-            <a:r>
-              <a:rPr lang="fr-FR" dirty="0"/>
-              <a:t>Ensuite le </a:t>
-            </a:r>
-            <a:r>
-              <a:rPr lang="fr-FR" i="1" dirty="0"/>
-              <a:t>driver</a:t>
-            </a:r>
-            <a:r>
-              <a:rPr lang="fr-FR" dirty="0"/>
-              <a:t>, le pilote permettant de communiquer avec le GPU	</a:t>
-            </a:r>
-          </a:p>
-          <a:p>
-            <a:pPr algn="just"/>
-            <a:endParaRPr lang="fr-FR" dirty="0" smtClean="0"/>
-          </a:p>
-          <a:p>
-            <a:pPr algn="just"/>
-            <a:r>
-              <a:rPr lang="fr-FR" dirty="0"/>
-              <a:t>En dernier se trouve le périphérique GPU (la carte graphique).</a:t>
-            </a:r>
+            <a:pPr marL="342900" lvl="1" indent="-342900"/>
+            <a:endParaRPr lang="fr-FR" dirty="0"/>
+          </a:p>
+          <a:p>
+            <a:pPr marL="742950" lvl="2" indent="-342900"/>
+            <a:endParaRPr lang="fr-FR" dirty="0"/>
+          </a:p>
+          <a:p>
+            <a:pPr lvl="1"/>
+            <a:endParaRPr lang="fr-FR" dirty="0"/>
           </a:p>
         </p:txBody>
       </p:sp>
@@ -14158,107 +14478,18 @@
           <a:bodyPr/>
           <a:lstStyle/>
           <a:p>
-            <a:fld id="{FA4012C4-FFAC-5345-A195-E6D68582D190}" type="datetime1">
+            <a:fld id="{0A758DEA-7C91-BA4C-A44B-B80849C2678D}" type="datetime1">
               <a:rPr lang="fr-FR" smtClean="0"/>
-              <a:t>07/09/15</a:t>
+              <a:t>18/09/15</a:t>
             </a:fld>
             <a:endParaRPr lang="fr-FR" dirty="0"/>
-          </a:p>
-        </p:txBody>
-      </p:sp>
-      <p:pic>
-        <p:nvPicPr>
-          <p:cNvPr id="9" name="Image 8"/>
-          <p:cNvPicPr>
-            <a:picLocks noChangeAspect="1"/>
-          </p:cNvPicPr>
-          <p:nvPr/>
-        </p:nvPicPr>
-        <p:blipFill>
-          <a:blip r:embed="rId2"/>
-          <a:stretch>
-            <a:fillRect/>
-          </a:stretch>
-        </p:blipFill>
-        <p:spPr>
-          <a:xfrm>
-            <a:off x="4860772" y="909198"/>
-            <a:ext cx="4229468" cy="5216965"/>
-          </a:xfrm>
-          <a:prstGeom prst="rect">
-            <a:avLst/>
-          </a:prstGeom>
-        </p:spPr>
-      </p:pic>
-      <p:sp>
-        <p:nvSpPr>
-          <p:cNvPr id="10" name="Rectangle 9"/>
-          <p:cNvSpPr/>
-          <p:nvPr/>
-        </p:nvSpPr>
-        <p:spPr>
-          <a:xfrm>
-            <a:off x="126084" y="6166503"/>
-            <a:ext cx="9017915" cy="307777"/>
-          </a:xfrm>
-          <a:prstGeom prst="rect">
-            <a:avLst/>
-          </a:prstGeom>
-        </p:spPr>
-        <p:txBody>
-          <a:bodyPr wrap="square">
-            <a:spAutoFit/>
-          </a:bodyPr>
-          <a:lstStyle/>
-          <a:p>
-            <a:r>
-              <a:rPr lang="fr-FR" sz="1400" dirty="0"/>
-              <a:t>http://www-</a:t>
-            </a:r>
-            <a:r>
-              <a:rPr lang="fr-FR" sz="1400" dirty="0" err="1"/>
-              <a:t>igm.univ</a:t>
-            </a:r>
-            <a:r>
-              <a:rPr lang="fr-FR" sz="1400" dirty="0"/>
-              <a:t>-</a:t>
-            </a:r>
-            <a:r>
-              <a:rPr lang="fr-FR" sz="1400" dirty="0" err="1"/>
-              <a:t>mlv.fr</a:t>
-            </a:r>
-            <a:r>
-              <a:rPr lang="fr-FR" sz="1400" dirty="0"/>
-              <a:t>/~</a:t>
-            </a:r>
-            <a:r>
-              <a:rPr lang="fr-FR" sz="1400" dirty="0" err="1"/>
-              <a:t>dr</a:t>
-            </a:r>
-            <a:r>
-              <a:rPr lang="fr-FR" sz="1400" dirty="0"/>
-              <a:t>/XPOSE2011/</a:t>
-            </a:r>
-            <a:r>
-              <a:rPr lang="fr-FR" sz="1400" dirty="0" err="1"/>
-              <a:t>openclgpucomputing</a:t>
-            </a:r>
-            <a:r>
-              <a:rPr lang="fr-FR" sz="1400" dirty="0"/>
-              <a:t>/</a:t>
-            </a:r>
-            <a:r>
-              <a:rPr lang="fr-FR" sz="1400" dirty="0" err="1"/>
-              <a:t>comment_programmer.php</a:t>
-            </a:r>
-            <a:endParaRPr lang="fr-FR" sz="1400" dirty="0"/>
           </a:p>
         </p:txBody>
       </p:sp>
     </p:spTree>
     <p:extLst>
       <p:ext uri="{BB962C8B-B14F-4D97-AF65-F5344CB8AC3E}">
-        <p14:creationId xmlns:p14="http://schemas.microsoft.com/office/powerpoint/2010/main" val="3615640945"/>
+        <p14:creationId xmlns:p14="http://schemas.microsoft.com/office/powerpoint/2010/main" val="565637550"/>
       </p:ext>
     </p:extLst>
   </p:cSld>
@@ -14317,175 +14548,207 @@
         <p:spPr/>
         <p:txBody>
           <a:bodyPr>
-            <a:normAutofit fontScale="77500" lnSpcReduction="20000"/>
+            <a:normAutofit fontScale="92500" lnSpcReduction="20000"/>
           </a:bodyPr>
           <a:lstStyle/>
           <a:p>
-            <a:pPr marL="0" indent="0">
+            <a:pPr marL="457200" lvl="1" indent="-457200">
+              <a:buFont typeface="Arial"/>
+              <a:buChar char="•"/>
+            </a:pPr>
+            <a:r>
+              <a:rPr lang="fr-FR" dirty="0" smtClean="0"/>
+              <a:t>Créer </a:t>
+            </a:r>
+            <a:r>
+              <a:rPr lang="fr-FR" dirty="0"/>
+              <a:t>le contexte pour le matériel</a:t>
+            </a:r>
+          </a:p>
+          <a:p>
+            <a:pPr lvl="1"/>
+            <a:r>
+              <a:rPr lang="fr-FR" dirty="0" smtClean="0"/>
+              <a:t>Contexte: conteneur abstrait attaché au matériel</a:t>
+            </a:r>
+          </a:p>
+          <a:p>
+            <a:pPr lvl="1"/>
+            <a:r>
+              <a:rPr lang="fr-FR" dirty="0" smtClean="0"/>
+              <a:t>Contient : </a:t>
+            </a:r>
+            <a:r>
+              <a:rPr lang="fr-FR" dirty="0" err="1" smtClean="0"/>
+              <a:t>kernels</a:t>
+            </a:r>
+            <a:r>
+              <a:rPr lang="fr-FR" dirty="0" smtClean="0"/>
+              <a:t>, objets en mémoire, liste des commandes</a:t>
+            </a:r>
+          </a:p>
+          <a:p>
+            <a:pPr lvl="2"/>
+            <a:r>
+              <a:rPr lang="fr-FR" dirty="0" smtClean="0"/>
+              <a:t>Méthode:</a:t>
+            </a:r>
+          </a:p>
+          <a:p>
+            <a:pPr marL="1371600" lvl="3" indent="0">
               <a:buNone/>
             </a:pPr>
             <a:r>
-              <a:rPr lang="fr-FR" dirty="0" smtClean="0"/>
-              <a:t>Principe d’</a:t>
-            </a:r>
-            <a:r>
               <a:rPr lang="fr-FR" dirty="0" err="1" smtClean="0"/>
-              <a:t>OpenCL</a:t>
-            </a:r>
-            <a:r>
-              <a:rPr lang="fr-FR" dirty="0" smtClean="0"/>
-              <a:t>:</a:t>
-            </a:r>
-          </a:p>
-          <a:p>
-            <a:pPr marL="971550" lvl="1" indent="-514350">
-              <a:buFont typeface="+mj-lt"/>
-              <a:buAutoNum type="arabicPeriod"/>
+              <a:t>context</a:t>
+            </a:r>
+            <a:r>
+              <a:rPr lang="fr-FR" dirty="0" smtClean="0"/>
+              <a:t> </a:t>
+            </a:r>
+            <a:r>
+              <a:rPr lang="fr-FR" dirty="0"/>
+              <a:t>= </a:t>
+            </a:r>
+            <a:r>
+              <a:rPr lang="fr-FR" dirty="0" err="1"/>
+              <a:t>clCreateContext</a:t>
+            </a:r>
+            <a:r>
+              <a:rPr lang="fr-FR" dirty="0"/>
+              <a:t>(NULL, 1, &amp;</a:t>
+            </a:r>
+            <a:r>
+              <a:rPr lang="fr-FR" dirty="0" err="1"/>
+              <a:t>device</a:t>
+            </a:r>
+            <a:r>
+              <a:rPr lang="fr-FR" dirty="0"/>
+              <a:t>, NULL, NULL, &amp;</a:t>
+            </a:r>
+            <a:r>
+              <a:rPr lang="fr-FR" dirty="0" err="1" smtClean="0"/>
+              <a:t>err</a:t>
+            </a:r>
+            <a:r>
+              <a:rPr lang="fr-FR" dirty="0" smtClean="0"/>
+              <a:t>); </a:t>
+            </a:r>
+            <a:endParaRPr lang="fr-FR" dirty="0"/>
+          </a:p>
+          <a:p>
+            <a:pPr lvl="3"/>
+            <a:endParaRPr lang="fr-FR" dirty="0" smtClean="0"/>
+          </a:p>
+          <a:p>
+            <a:pPr marL="342900" lvl="1" indent="-342900">
+              <a:buFont typeface="Arial"/>
+              <a:buChar char="•"/>
             </a:pPr>
             <a:r>
-              <a:rPr lang="fr-FR" dirty="0" smtClean="0"/>
-              <a:t>Obtenir le contexte</a:t>
-            </a:r>
-          </a:p>
-          <a:p>
-            <a:pPr marL="971550" lvl="1" indent="-514350">
-              <a:buFont typeface="+mj-lt"/>
-              <a:buAutoNum type="arabicPeriod"/>
-            </a:pPr>
-            <a:r>
-              <a:rPr lang="fr-FR" dirty="0" smtClean="0"/>
-              <a:t>Récupérer l’id de l’accélérateur</a:t>
-            </a:r>
-          </a:p>
-          <a:p>
-            <a:pPr marL="971550" lvl="1" indent="-514350">
-              <a:buFont typeface="+mj-lt"/>
-              <a:buAutoNum type="arabicPeriod"/>
-            </a:pPr>
-            <a:r>
-              <a:rPr lang="fr-FR" dirty="0" smtClean="0"/>
-              <a:t>Créer le contexte pour le matériel</a:t>
-            </a:r>
-          </a:p>
-          <a:p>
-            <a:pPr marL="971550" lvl="1" indent="-514350">
-              <a:buFont typeface="+mj-lt"/>
-              <a:buAutoNum type="arabicPeriod"/>
-            </a:pPr>
-            <a:r>
-              <a:rPr lang="fr-FR" dirty="0" smtClean="0"/>
+              <a:rPr lang="fr-FR" dirty="0"/>
               <a:t>Créer le programme à partir du code source</a:t>
             </a:r>
           </a:p>
           <a:p>
-            <a:pPr marL="971550" lvl="1" indent="-514350">
-              <a:buFont typeface="+mj-lt"/>
-              <a:buAutoNum type="arabicPeriod"/>
-            </a:pPr>
+            <a:pPr lvl="1"/>
+            <a:r>
+              <a:rPr lang="fr-FR" dirty="0" smtClean="0"/>
+              <a:t>Définit dans des fichiers </a:t>
+            </a:r>
+            <a:r>
+              <a:rPr lang="fr-FR" i="1" dirty="0" smtClean="0"/>
+              <a:t>.cl</a:t>
+            </a:r>
+          </a:p>
+          <a:p>
+            <a:pPr lvl="1"/>
+            <a:r>
+              <a:rPr lang="fr-FR" dirty="0" smtClean="0"/>
+              <a:t>L’hôte lit ce fichier </a:t>
+            </a:r>
+          </a:p>
+          <a:p>
+            <a:pPr lvl="1"/>
+            <a:r>
+              <a:rPr lang="fr-FR" dirty="0" smtClean="0"/>
+              <a:t>Il crée un </a:t>
+            </a:r>
+            <a:r>
+              <a:rPr lang="fr-FR" i="1" dirty="0" err="1" smtClean="0"/>
+              <a:t>cl_program</a:t>
+            </a:r>
+            <a:r>
+              <a:rPr lang="fr-FR" dirty="0" smtClean="0"/>
+              <a:t> attaché au contexte</a:t>
+            </a:r>
+          </a:p>
+          <a:p>
+            <a:pPr lvl="2"/>
+            <a:r>
+              <a:rPr lang="fr-FR" dirty="0" smtClean="0"/>
+              <a:t>Méthode:</a:t>
+            </a:r>
+          </a:p>
+          <a:p>
+            <a:pPr lvl="2"/>
+            <a:r>
+              <a:rPr lang="fr-FR" dirty="0"/>
+              <a:t>program = </a:t>
+            </a:r>
+            <a:r>
+              <a:rPr lang="fr-FR" dirty="0" err="1"/>
+              <a:t>clCreateProgramWithSource</a:t>
+            </a:r>
+            <a:r>
+              <a:rPr lang="fr-FR" dirty="0"/>
+              <a:t> (</a:t>
+            </a:r>
+            <a:r>
+              <a:rPr lang="fr-FR" dirty="0" err="1"/>
+              <a:t>context</a:t>
+            </a:r>
+            <a:r>
+              <a:rPr lang="fr-FR" dirty="0"/>
+              <a:t>, 1, (</a:t>
+            </a:r>
+            <a:r>
+              <a:rPr lang="fr-FR" dirty="0" err="1"/>
+              <a:t>const</a:t>
+            </a:r>
+            <a:r>
+              <a:rPr lang="fr-FR" dirty="0"/>
+              <a:t> char**) &amp;</a:t>
+            </a:r>
+            <a:r>
+              <a:rPr lang="fr-FR" dirty="0" err="1"/>
+              <a:t>program_buffer</a:t>
+            </a:r>
+            <a:r>
+              <a:rPr lang="fr-FR" dirty="0"/>
+              <a:t>, &amp;</a:t>
+            </a:r>
+            <a:r>
+              <a:rPr lang="fr-FR" dirty="0" err="1"/>
+              <a:t>program_size</a:t>
+            </a:r>
+            <a:r>
+              <a:rPr lang="fr-FR" dirty="0"/>
+              <a:t>, &amp;</a:t>
+            </a:r>
             <a:r>
               <a:rPr lang="fr-FR" dirty="0" err="1" smtClean="0"/>
-              <a:t>Build</a:t>
-            </a:r>
-            <a:r>
-              <a:rPr lang="fr-FR" dirty="0" smtClean="0"/>
-              <a:t> du programme</a:t>
-            </a:r>
-          </a:p>
-          <a:p>
-            <a:pPr marL="971550" lvl="1" indent="-514350">
-              <a:buFont typeface="+mj-lt"/>
-              <a:buAutoNum type="arabicPeriod"/>
-            </a:pPr>
-            <a:r>
-              <a:rPr lang="fr-FR" dirty="0" smtClean="0"/>
-              <a:t>Création des </a:t>
-            </a:r>
-            <a:r>
-              <a:rPr lang="fr-FR" dirty="0" err="1" smtClean="0"/>
-              <a:t>kernels</a:t>
-            </a:r>
-            <a:endParaRPr lang="fr-FR" dirty="0" smtClean="0"/>
-          </a:p>
-          <a:p>
-            <a:pPr marL="971550" lvl="1" indent="-514350">
-              <a:buFont typeface="+mj-lt"/>
-              <a:buAutoNum type="arabicPeriod"/>
-            </a:pPr>
-            <a:r>
-              <a:rPr lang="fr-FR" dirty="0" smtClean="0"/>
-              <a:t>Création de la queue de commande pour le matériel</a:t>
-            </a:r>
-          </a:p>
-          <a:p>
-            <a:pPr marL="971550" lvl="1" indent="-514350">
-              <a:buFont typeface="+mj-lt"/>
-              <a:buAutoNum type="arabicPeriod"/>
-            </a:pPr>
-            <a:r>
-              <a:rPr lang="fr-FR" dirty="0" smtClean="0"/>
-              <a:t>Allocation de la mémoire/ déplacement des données</a:t>
-            </a:r>
-          </a:p>
-          <a:p>
-            <a:pPr marL="971550" lvl="1" indent="-514350">
-              <a:buFont typeface="+mj-lt"/>
-              <a:buAutoNum type="arabicPeriod"/>
-            </a:pPr>
-            <a:r>
-              <a:rPr lang="fr-FR" dirty="0" smtClean="0"/>
-              <a:t>Association des arguments aux </a:t>
-            </a:r>
-            <a:r>
-              <a:rPr lang="fr-FR" dirty="0" err="1" smtClean="0"/>
-              <a:t>kernels</a:t>
-            </a:r>
-            <a:endParaRPr lang="fr-FR" dirty="0" smtClean="0"/>
-          </a:p>
-          <a:p>
-            <a:pPr marL="971550" lvl="1" indent="-514350">
-              <a:buFont typeface="+mj-lt"/>
-              <a:buAutoNum type="arabicPeriod"/>
-            </a:pPr>
-            <a:r>
-              <a:rPr lang="fr-FR" dirty="0" smtClean="0"/>
-              <a:t>Déploiement des </a:t>
-            </a:r>
-            <a:r>
-              <a:rPr lang="fr-FR" dirty="0" err="1" smtClean="0"/>
-              <a:t>kernels</a:t>
-            </a:r>
-            <a:r>
-              <a:rPr lang="fr-FR" dirty="0" smtClean="0"/>
-              <a:t> pour l’exécution</a:t>
-            </a:r>
-          </a:p>
-          <a:p>
-            <a:pPr marL="971550" lvl="1" indent="-514350">
-              <a:buFont typeface="+mj-lt"/>
-              <a:buAutoNum type="arabicPeriod"/>
-            </a:pPr>
-            <a:r>
-              <a:rPr lang="fr-FR" dirty="0" smtClean="0"/>
-              <a:t>Déplacement des résultats vers la mémoire hôte</a:t>
-            </a:r>
-          </a:p>
-          <a:p>
-            <a:pPr marL="971550" lvl="1" indent="-514350">
-              <a:buFont typeface="+mj-lt"/>
-              <a:buAutoNum type="arabicPeriod"/>
-            </a:pPr>
-            <a:r>
-              <a:rPr lang="fr-FR" dirty="0" smtClean="0"/>
-              <a:t>Relâchement du contexte, programme, </a:t>
-            </a:r>
-            <a:r>
-              <a:rPr lang="fr-FR" dirty="0" err="1" smtClean="0"/>
-              <a:t>kernel</a:t>
-            </a:r>
-            <a:r>
-              <a:rPr lang="fr-FR" dirty="0" smtClean="0"/>
-              <a:t> et mémoire.</a:t>
-            </a:r>
+              <a:t>err</a:t>
+            </a:r>
+            <a:r>
+              <a:rPr lang="fr-FR" dirty="0" smtClean="0"/>
+              <a:t>); </a:t>
+            </a:r>
+            <a:endParaRPr lang="fr-FR" dirty="0"/>
+          </a:p>
+          <a:p>
+            <a:pPr lvl="2"/>
+            <a:endParaRPr lang="fr-FR" dirty="0"/>
           </a:p>
         </p:txBody>
       </p:sp>
@@ -14551,9 +14814,9 @@
           <a:bodyPr/>
           <a:lstStyle/>
           <a:p>
-            <a:fld id="{233CE4CD-57CA-1E4C-B208-688E965A27A9}" type="datetime1">
+            <a:fld id="{1717C17D-FF51-0144-9701-6C3391B94BAD}" type="datetime1">
               <a:rPr lang="fr-FR" smtClean="0"/>
-              <a:t>07/09/15</a:t>
+              <a:t>18/09/15</a:t>
             </a:fld>
             <a:endParaRPr lang="fr-FR" dirty="0"/>
           </a:p>
@@ -14562,7 +14825,7 @@
     </p:spTree>
     <p:extLst>
       <p:ext uri="{BB962C8B-B14F-4D97-AF65-F5344CB8AC3E}">
-        <p14:creationId xmlns:p14="http://schemas.microsoft.com/office/powerpoint/2010/main" val="758336139"/>
+        <p14:creationId xmlns:p14="http://schemas.microsoft.com/office/powerpoint/2010/main" val="2066301256"/>
       </p:ext>
     </p:extLst>
   </p:cSld>
@@ -14620,118 +14883,170 @@
         </p:nvSpPr>
         <p:spPr/>
         <p:txBody>
-          <a:bodyPr/>
-          <a:lstStyle/>
-          <a:p>
-            <a:pPr marL="514350" lvl="1" indent="-514350">
-              <a:buFont typeface="Arial"/>
-              <a:buChar char="•"/>
+          <a:bodyPr>
+            <a:normAutofit fontScale="92500" lnSpcReduction="20000"/>
+          </a:bodyPr>
+          <a:lstStyle/>
+          <a:p>
+            <a:r>
+              <a:rPr lang="fr-FR" dirty="0" err="1"/>
+              <a:t>Build</a:t>
+            </a:r>
+            <a:r>
+              <a:rPr lang="fr-FR" dirty="0"/>
+              <a:t> du </a:t>
+            </a:r>
+            <a:r>
+              <a:rPr lang="fr-FR" dirty="0" smtClean="0"/>
+              <a:t>programme</a:t>
+            </a:r>
+          </a:p>
+          <a:p>
+            <a:pPr lvl="1"/>
+            <a:r>
+              <a:rPr lang="fr-FR" dirty="0" smtClean="0"/>
+              <a:t>Compilation du programme lors de l’exécution</a:t>
+            </a:r>
+          </a:p>
+          <a:p>
+            <a:pPr lvl="2"/>
+            <a:r>
+              <a:rPr lang="fr-FR" dirty="0" smtClean="0"/>
+              <a:t>Compile même en cas d’erreur</a:t>
+            </a:r>
+          </a:p>
+          <a:p>
+            <a:pPr lvl="2"/>
+            <a:r>
+              <a:rPr lang="fr-FR" dirty="0" smtClean="0"/>
+              <a:t>Vérification des erreurs lors de l’exécution</a:t>
+            </a:r>
+          </a:p>
+          <a:p>
+            <a:pPr lvl="1"/>
+            <a:r>
+              <a:rPr lang="fr-FR" dirty="0" smtClean="0"/>
+              <a:t>Méthode:</a:t>
+            </a:r>
+          </a:p>
+          <a:p>
+            <a:pPr marL="914400" lvl="2" indent="0">
+              <a:buNone/>
             </a:pPr>
             <a:r>
-              <a:rPr lang="fr-FR" dirty="0"/>
-              <a:t>Obtenir le contexte</a:t>
-            </a:r>
-          </a:p>
-          <a:p>
-            <a:pPr marL="742950" lvl="2" indent="-342900"/>
+              <a:rPr lang="fr-FR" dirty="0" err="1"/>
+              <a:t>clBuildProgram</a:t>
+            </a:r>
+            <a:r>
+              <a:rPr lang="fr-FR" dirty="0"/>
+              <a:t>(program, 0,..) </a:t>
+            </a:r>
+            <a:r>
+              <a:rPr lang="fr-FR" dirty="0" smtClean="0"/>
+              <a:t>;</a:t>
+            </a:r>
+            <a:endParaRPr lang="fr-FR" dirty="0"/>
+          </a:p>
+          <a:p>
+            <a:pPr lvl="2"/>
+            <a:endParaRPr lang="fr-FR" dirty="0"/>
+          </a:p>
+          <a:p>
+            <a:r>
+              <a:rPr lang="fr-FR" dirty="0"/>
+              <a:t>Création des </a:t>
+            </a:r>
+            <a:r>
+              <a:rPr lang="fr-FR" dirty="0" err="1"/>
+              <a:t>kernels</a:t>
+            </a:r>
+            <a:endParaRPr lang="fr-FR" dirty="0"/>
+          </a:p>
+          <a:p>
+            <a:pPr lvl="1"/>
+            <a:r>
+              <a:rPr lang="fr-FR" dirty="0" smtClean="0"/>
+              <a:t>Noyaux de calculs</a:t>
+            </a:r>
+          </a:p>
+          <a:p>
+            <a:pPr lvl="1"/>
+            <a:r>
+              <a:rPr lang="fr-FR" dirty="0" smtClean="0"/>
+              <a:t>Création des </a:t>
+            </a:r>
+            <a:r>
+              <a:rPr lang="fr-FR" i="1" dirty="0" err="1" smtClean="0"/>
+              <a:t>cl_kernel</a:t>
+            </a:r>
+            <a:r>
+              <a:rPr lang="fr-FR" i="1" dirty="0" smtClean="0"/>
+              <a:t> </a:t>
+            </a:r>
+            <a:r>
+              <a:rPr lang="fr-FR" dirty="0" smtClean="0"/>
+              <a:t>à partir des </a:t>
+            </a:r>
+            <a:r>
+              <a:rPr lang="fr-FR" dirty="0" err="1" smtClean="0"/>
+              <a:t>prgorammes</a:t>
+            </a:r>
+            <a:r>
+              <a:rPr lang="fr-FR" dirty="0" smtClean="0"/>
+              <a:t> précédents</a:t>
+            </a:r>
+          </a:p>
+          <a:p>
+            <a:pPr lvl="1"/>
             <a:r>
               <a:rPr lang="fr-FR" dirty="0" smtClean="0"/>
               <a:t>Méthode:</a:t>
             </a:r>
           </a:p>
           <a:p>
-            <a:pPr marL="1200150" lvl="3" indent="-342900"/>
-            <a:r>
-              <a:rPr lang="fr-FR" dirty="0" err="1" smtClean="0"/>
-              <a:t>clGetPlatformIDs</a:t>
-            </a:r>
-            <a:r>
-              <a:rPr lang="fr-FR" dirty="0"/>
-              <a:t>(1, &amp;</a:t>
-            </a:r>
+            <a:pPr marL="914400" lvl="2" indent="0">
+              <a:buNone/>
+            </a:pPr>
             <a:r>
               <a:rPr lang="fr-FR" dirty="0" err="1"/>
-              <a:t>platform</a:t>
-            </a:r>
-            <a:r>
-              <a:rPr lang="fr-FR" dirty="0"/>
-              <a:t>, NULL); </a:t>
-            </a:r>
-            <a:endParaRPr lang="fr-FR" dirty="0" smtClean="0"/>
-          </a:p>
-          <a:p>
-            <a:pPr marL="742950" lvl="2" indent="-342900"/>
-            <a:r>
-              <a:rPr lang="fr-FR" dirty="0" smtClean="0"/>
-              <a:t>Utilisé deux fois pour récupérer le nombre de dispositif</a:t>
-            </a:r>
-          </a:p>
-          <a:p>
-            <a:pPr marL="742950" lvl="2" indent="-342900"/>
-            <a:endParaRPr lang="fr-FR" dirty="0"/>
-          </a:p>
-          <a:p>
-            <a:pPr marL="457200" lvl="1" indent="-457200">
-              <a:buFont typeface="Arial"/>
-              <a:buChar char="•"/>
-            </a:pPr>
-            <a:r>
-              <a:rPr lang="fr-FR" dirty="0"/>
-              <a:t>Récupérer l’id de </a:t>
-            </a:r>
-            <a:r>
-              <a:rPr lang="fr-FR" dirty="0" smtClean="0"/>
-              <a:t>l’accélérateur</a:t>
-            </a:r>
-          </a:p>
-          <a:p>
-            <a:pPr marL="742950" lvl="2" indent="-342900"/>
-            <a:r>
-              <a:rPr lang="fr-FR" dirty="0" smtClean="0"/>
-              <a:t>Méthode:</a:t>
-            </a:r>
-          </a:p>
-          <a:p>
-            <a:pPr marL="1200150" lvl="3" indent="-342900"/>
+              <a:t>kernel</a:t>
+            </a:r>
+            <a:r>
+              <a:rPr lang="fr-FR" dirty="0"/>
+              <a:t> = </a:t>
+            </a:r>
             <a:r>
               <a:rPr lang="fr-FR" dirty="0" err="1"/>
-              <a:t>clGetDeviceIds</a:t>
-            </a:r>
-            <a:r>
-              <a:rPr lang="fr-FR" dirty="0"/>
-              <a:t>(</a:t>
+              <a:t>clCreateKernel</a:t>
+            </a:r>
+            <a:r>
+              <a:rPr lang="fr-FR" dirty="0"/>
+              <a:t>(program, "</a:t>
             </a:r>
             <a:r>
               <a:rPr lang="fr-FR" dirty="0" err="1"/>
-              <a:t>platform</a:t>
-            </a:r>
-            <a:r>
-              <a:rPr lang="fr-FR" dirty="0"/>
-              <a:t>, CL_DEVICE_TYPE_GPU, 1, &amp;</a:t>
+              <a:t>kernel_name</a:t>
+            </a:r>
+            <a:r>
+              <a:rPr lang="fr-FR" dirty="0"/>
+              <a:t>", &amp;</a:t>
             </a:r>
             <a:r>
               <a:rPr lang="fr-FR" dirty="0" err="1"/>
-              <a:t>device</a:t>
-            </a:r>
-            <a:r>
-              <a:rPr lang="fr-FR" dirty="0"/>
-              <a:t>, NULL); </a:t>
-            </a:r>
-          </a:p>
-          <a:p>
-            <a:pPr marL="1200150" lvl="3" indent="-342900"/>
-            <a:endParaRPr lang="fr-FR" dirty="0" smtClean="0"/>
-          </a:p>
-          <a:p>
-            <a:pPr marL="342900" lvl="1" indent="-342900"/>
-            <a:endParaRPr lang="fr-FR" dirty="0"/>
-          </a:p>
-          <a:p>
-            <a:pPr marL="742950" lvl="2" indent="-342900"/>
-            <a:endParaRPr lang="fr-FR" dirty="0"/>
-          </a:p>
-          <a:p>
-            <a:pPr lvl="1"/>
+              <a:t>err</a:t>
+            </a:r>
+            <a:r>
+              <a:rPr lang="fr-FR" dirty="0"/>
+              <a:t>) </a:t>
+            </a:r>
+            <a:r>
+              <a:rPr lang="fr-FR" dirty="0" smtClean="0"/>
+              <a:t>;</a:t>
+            </a:r>
+            <a:endParaRPr lang="fr-FR" dirty="0"/>
+          </a:p>
+          <a:p>
+            <a:pPr lvl="2"/>
             <a:endParaRPr lang="fr-FR" dirty="0"/>
           </a:p>
         </p:txBody>
@@ -14798,9 +15113,9 @@
           <a:bodyPr/>
           <a:lstStyle/>
           <a:p>
-            <a:fld id="{0A758DEA-7C91-BA4C-A44B-B80849C2678D}" type="datetime1">
+            <a:fld id="{BC286C36-F388-D843-9417-6D205DF11E23}" type="datetime1">
               <a:rPr lang="fr-FR" smtClean="0"/>
-              <a:t>07/09/15</a:t>
+              <a:t>18/09/15</a:t>
             </a:fld>
             <a:endParaRPr lang="fr-FR" dirty="0"/>
           </a:p>
@@ -14809,7 +15124,7 @@
     </p:spTree>
     <p:extLst>
       <p:ext uri="{BB962C8B-B14F-4D97-AF65-F5344CB8AC3E}">
-        <p14:creationId xmlns:p14="http://schemas.microsoft.com/office/powerpoint/2010/main" val="565637550"/>
+        <p14:creationId xmlns:p14="http://schemas.microsoft.com/office/powerpoint/2010/main" val="3085525198"/>
       </p:ext>
     </p:extLst>
   </p:cSld>
@@ -14868,43 +15183,24 @@
         <p:spPr/>
         <p:txBody>
           <a:bodyPr>
-            <a:normAutofit fontScale="92500" lnSpcReduction="20000"/>
+            <a:normAutofit fontScale="85000" lnSpcReduction="10000"/>
           </a:bodyPr>
           <a:lstStyle/>
           <a:p>
-            <a:pPr marL="457200" lvl="1" indent="-457200">
-              <a:buFont typeface="Arial"/>
-              <a:buChar char="•"/>
-            </a:pPr>
-            <a:r>
-              <a:rPr lang="fr-FR" dirty="0" smtClean="0"/>
-              <a:t>Créer </a:t>
-            </a:r>
-            <a:r>
-              <a:rPr lang="fr-FR" dirty="0"/>
-              <a:t>le contexte pour le matériel</a:t>
+            <a:r>
+              <a:rPr lang="fr-FR" dirty="0"/>
+              <a:t>Création de la queue de commande pour le </a:t>
+            </a:r>
+            <a:r>
+              <a:rPr lang="fr-FR" dirty="0" smtClean="0"/>
+              <a:t>matériel</a:t>
             </a:r>
           </a:p>
           <a:p>
             <a:pPr lvl="1"/>
             <a:r>
               <a:rPr lang="fr-FR" dirty="0" smtClean="0"/>
-              <a:t>Contexte: conteneur abstrait attaché au matériel</a:t>
-            </a:r>
-          </a:p>
-          <a:p>
-            <a:pPr lvl="1"/>
-            <a:r>
-              <a:rPr lang="fr-FR" dirty="0" smtClean="0"/>
-              <a:t>Contient : </a:t>
-            </a:r>
-            <a:r>
-              <a:rPr lang="fr-FR" dirty="0" err="1" smtClean="0"/>
-              <a:t>kernels</a:t>
-            </a:r>
-            <a:r>
-              <a:rPr lang="fr-FR" dirty="0" smtClean="0"/>
-              <a:t>, objets en mémoire, liste des commandes</a:t>
+              <a:t>Chaque queue est attaché à un matériel</a:t>
             </a:r>
           </a:p>
           <a:p>
@@ -14915,28 +15211,26 @@
             </a:r>
           </a:p>
           <a:p>
-            <a:pPr marL="1371600" lvl="3" indent="0">
-              <a:buNone/>
-            </a:pPr>
-            <a:r>
-              <a:rPr lang="fr-FR" dirty="0" err="1" smtClean="0"/>
+            <a:pPr lvl="3"/>
+            <a:r>
+              <a:rPr lang="fr-FR" dirty="0"/>
+              <a:t>queue = </a:t>
+            </a:r>
+            <a:r>
+              <a:rPr lang="fr-FR" dirty="0" err="1"/>
+              <a:t>clCreateCommandQueue</a:t>
+            </a:r>
+            <a:r>
+              <a:rPr lang="fr-FR" dirty="0"/>
+              <a:t>(</a:t>
+            </a:r>
+            <a:r>
+              <a:rPr lang="fr-FR" dirty="0" err="1"/>
               <a:t>context</a:t>
             </a:r>
             <a:r>
-              <a:rPr lang="fr-FR" dirty="0" smtClean="0"/>
-              <a:t> </a:t>
-            </a:r>
-            <a:r>
-              <a:rPr lang="fr-FR" dirty="0"/>
-              <a:t>= </a:t>
-            </a:r>
-            <a:r>
-              <a:rPr lang="fr-FR" dirty="0" err="1"/>
-              <a:t>clCreateContext</a:t>
-            </a:r>
-            <a:r>
-              <a:rPr lang="fr-FR" dirty="0"/>
-              <a:t>(NULL, 1, &amp;</a:t>
+              <a:rPr lang="fr-FR" dirty="0"/>
+              <a:t>, </a:t>
             </a:r>
             <a:r>
               <a:rPr lang="fr-FR" dirty="0" err="1"/>
@@ -14944,7 +15238,7 @@
             </a:r>
             <a:r>
               <a:rPr lang="fr-FR" dirty="0"/>
-              <a:t>, NULL, NULL, &amp;</a:t>
+              <a:t>, 0, &amp;</a:t>
             </a:r>
             <a:r>
               <a:rPr lang="fr-FR" dirty="0" err="1" smtClean="0"/>
@@ -14961,64 +15255,39 @@
             <a:endParaRPr lang="fr-FR" dirty="0" smtClean="0"/>
           </a:p>
           <a:p>
-            <a:pPr marL="342900" lvl="1" indent="-342900">
-              <a:buFont typeface="Arial"/>
-              <a:buChar char="•"/>
-            </a:pPr>
-            <a:r>
-              <a:rPr lang="fr-FR" dirty="0"/>
-              <a:t>Créer le programme à partir du code source</a:t>
+            <a:r>
+              <a:rPr lang="fr-FR" dirty="0" smtClean="0"/>
+              <a:t>Allocation </a:t>
+            </a:r>
+            <a:r>
+              <a:rPr lang="fr-FR" dirty="0"/>
+              <a:t>de la mémoire/ déplacement des </a:t>
+            </a:r>
+            <a:r>
+              <a:rPr lang="fr-FR" dirty="0" smtClean="0"/>
+              <a:t>données</a:t>
             </a:r>
           </a:p>
           <a:p>
             <a:pPr lvl="1"/>
             <a:r>
               <a:rPr lang="fr-FR" dirty="0" smtClean="0"/>
-              <a:t>Définit dans des fichiers </a:t>
-            </a:r>
-            <a:r>
-              <a:rPr lang="fr-FR" i="1" dirty="0" smtClean="0"/>
-              <a:t>.cl</a:t>
-            </a:r>
-          </a:p>
-          <a:p>
-            <a:pPr lvl="1"/>
-            <a:r>
-              <a:rPr lang="fr-FR" dirty="0" smtClean="0"/>
-              <a:t>L’hôte lit ce fichier </a:t>
-            </a:r>
-          </a:p>
-          <a:p>
-            <a:pPr lvl="1"/>
-            <a:r>
-              <a:rPr lang="fr-FR" dirty="0" smtClean="0"/>
-              <a:t>Il crée un </a:t>
-            </a:r>
-            <a:r>
-              <a:rPr lang="fr-FR" i="1" dirty="0" err="1" smtClean="0"/>
-              <a:t>cl_program</a:t>
-            </a:r>
-            <a:r>
-              <a:rPr lang="fr-FR" dirty="0" smtClean="0"/>
-              <a:t> attaché au contexte</a:t>
+              <a:t>Méthode:</a:t>
             </a:r>
           </a:p>
           <a:p>
             <a:pPr lvl="2"/>
             <a:r>
-              <a:rPr lang="fr-FR" dirty="0" smtClean="0"/>
-              <a:t>Méthode:</a:t>
-            </a:r>
-          </a:p>
-          <a:p>
-            <a:pPr lvl="2"/>
-            <a:r>
-              <a:rPr lang="fr-FR" dirty="0"/>
-              <a:t>program = </a:t>
-            </a:r>
-            <a:r>
               <a:rPr lang="fr-FR" dirty="0" err="1"/>
-              <a:t>clCreateProgramWithSource</a:t>
+              <a:t>memObject</a:t>
+            </a:r>
+            <a:r>
+              <a:rPr lang="fr-FR" dirty="0"/>
+              <a:t> = </a:t>
+            </a:r>
+            <a:r>
+              <a:rPr lang="fr-FR" dirty="0" err="1"/>
+              <a:t>clCreateBuffer</a:t>
             </a:r>
             <a:r>
               <a:rPr lang="fr-FR" dirty="0"/>
@@ -15030,44 +15299,77 @@
             </a:r>
             <a:r>
               <a:rPr lang="fr-FR" dirty="0"/>
-              <a:t>, 1, (</a:t>
+              <a:t>, NULL, SIZE_N, NULL, &amp;</a:t>
             </a:r>
             <a:r>
               <a:rPr lang="fr-FR" dirty="0" err="1"/>
-              <a:t>const</a:t>
-            </a:r>
-            <a:r>
-              <a:rPr lang="fr-FR" dirty="0"/>
-              <a:t> char**) &amp;</a:t>
+              <a:t>err</a:t>
+            </a:r>
+            <a:r>
+              <a:rPr lang="fr-FR" dirty="0"/>
+              <a:t>) </a:t>
+            </a:r>
+          </a:p>
+          <a:p>
+            <a:pPr lvl="2"/>
+            <a:r>
+              <a:rPr lang="fr-FR" dirty="0" err="1" smtClean="0"/>
+              <a:t>clEnqueueWriteBuffer</a:t>
+            </a:r>
+            <a:r>
+              <a:rPr lang="fr-FR" dirty="0"/>
+              <a:t>(</a:t>
             </a:r>
             <a:r>
               <a:rPr lang="fr-FR" dirty="0" err="1"/>
-              <a:t>program_buffer</a:t>
-            </a:r>
-            <a:r>
-              <a:rPr lang="fr-FR" dirty="0"/>
-              <a:t>, &amp;</a:t>
+              <a:t>command_queue</a:t>
+            </a:r>
+            <a:r>
+              <a:rPr lang="fr-FR" dirty="0"/>
+              <a:t>, </a:t>
             </a:r>
             <a:r>
               <a:rPr lang="fr-FR" dirty="0" err="1"/>
-              <a:t>program_size</a:t>
-            </a:r>
-            <a:r>
-              <a:rPr lang="fr-FR" dirty="0"/>
-              <a:t>, &amp;</a:t>
-            </a:r>
-            <a:r>
-              <a:rPr lang="fr-FR" dirty="0" err="1" smtClean="0"/>
-              <a:t>err</a:t>
-            </a:r>
-            <a:r>
-              <a:rPr lang="fr-FR" dirty="0" smtClean="0"/>
-              <a:t>); </a:t>
-            </a:r>
-            <a:endParaRPr lang="fr-FR" dirty="0"/>
+              <a:t>memObject</a:t>
+            </a:r>
+            <a:r>
+              <a:rPr lang="fr-FR" dirty="0"/>
+              <a:t>, ..., TOTAL_SIZE, </a:t>
+            </a:r>
+            <a:r>
+              <a:rPr lang="fr-FR" dirty="0" err="1"/>
+              <a:t>hostPointer</a:t>
+            </a:r>
+            <a:r>
+              <a:rPr lang="fr-FR" dirty="0"/>
+              <a:t>, ...) </a:t>
+            </a:r>
+            <a:endParaRPr lang="fr-FR" dirty="0" smtClean="0"/>
+          </a:p>
+          <a:p>
+            <a:pPr lvl="1"/>
+            <a:r>
+              <a:rPr lang="fr-FR" dirty="0" smtClean="0"/>
+              <a:t>La mémoire peut être stocké en buffer ou en images.</a:t>
+            </a:r>
           </a:p>
           <a:p>
             <a:pPr lvl="2"/>
+            <a:r>
+              <a:rPr lang="fr-FR" dirty="0" smtClean="0"/>
+              <a:t>Mémoire contigu</a:t>
+            </a:r>
+          </a:p>
+          <a:p>
+            <a:pPr lvl="2"/>
+            <a:r>
+              <a:rPr lang="fr-FR" dirty="0" smtClean="0"/>
+              <a:t>Possibilité de lecture / écriture</a:t>
+            </a:r>
+            <a:endParaRPr lang="fr-FR" dirty="0"/>
+          </a:p>
+          <a:p>
+            <a:pPr lvl="1"/>
             <a:endParaRPr lang="fr-FR" dirty="0"/>
           </a:p>
         </p:txBody>
@@ -15134,9 +15436,9 @@
           <a:bodyPr/>
           <a:lstStyle/>
           <a:p>
-            <a:fld id="{1717C17D-FF51-0144-9701-6C3391B94BAD}" type="datetime1">
+            <a:fld id="{19CFA63D-2380-9F4A-A770-BF0454DD5ABF}" type="datetime1">
               <a:rPr lang="fr-FR" smtClean="0"/>
-              <a:t>07/09/15</a:t>
+              <a:t>18/09/15</a:t>
             </a:fld>
             <a:endParaRPr lang="fr-FR" dirty="0"/>
           </a:p>
@@ -15145,7 +15447,7 @@
     </p:spTree>
     <p:extLst>
       <p:ext uri="{BB962C8B-B14F-4D97-AF65-F5344CB8AC3E}">
-        <p14:creationId xmlns:p14="http://schemas.microsoft.com/office/powerpoint/2010/main" val="2066301256"/>
+        <p14:creationId xmlns:p14="http://schemas.microsoft.com/office/powerpoint/2010/main" val="9922291"/>
       </p:ext>
     </p:extLst>
   </p:cSld>
@@ -15204,43 +15506,19 @@
         <p:spPr/>
         <p:txBody>
           <a:bodyPr>
-            <a:normAutofit fontScale="92500" lnSpcReduction="20000"/>
+            <a:normAutofit lnSpcReduction="10000"/>
           </a:bodyPr>
           <a:lstStyle/>
           <a:p>
             <a:r>
-              <a:rPr lang="fr-FR" dirty="0" err="1"/>
-              <a:t>Build</a:t>
-            </a:r>
-            <a:r>
-              <a:rPr lang="fr-FR" dirty="0"/>
-              <a:t> du </a:t>
-            </a:r>
-            <a:r>
-              <a:rPr lang="fr-FR" dirty="0" smtClean="0"/>
-              <a:t>programme</a:t>
-            </a:r>
-          </a:p>
-          <a:p>
-            <a:pPr lvl="1"/>
-            <a:r>
-              <a:rPr lang="fr-FR" dirty="0" smtClean="0"/>
-              <a:t>Compilation du programme lors de l’exécution</a:t>
-            </a:r>
-          </a:p>
-          <a:p>
-            <a:pPr lvl="2"/>
-            <a:r>
-              <a:rPr lang="fr-FR" dirty="0" smtClean="0"/>
-              <a:t>Compile même en cas d’erreur</a:t>
-            </a:r>
-          </a:p>
-          <a:p>
-            <a:pPr lvl="2"/>
-            <a:r>
-              <a:rPr lang="fr-FR" dirty="0" smtClean="0"/>
-              <a:t>Vérification des erreurs lors de l’exécution</a:t>
-            </a:r>
+              <a:rPr lang="fr-FR" dirty="0"/>
+              <a:t>Association des arguments aux </a:t>
+            </a:r>
+            <a:r>
+              <a:rPr lang="fr-FR" dirty="0" err="1" smtClean="0"/>
+              <a:t>kernels</a:t>
+            </a:r>
+            <a:endParaRPr lang="fr-FR" dirty="0" smtClean="0"/>
           </a:p>
           <a:p>
             <a:pPr lvl="1"/>
@@ -15255,65 +15533,73 @@
             </a:pPr>
             <a:r>
               <a:rPr lang="fr-FR" dirty="0" err="1"/>
-              <a:t>clBuildProgram</a:t>
-            </a:r>
-            <a:r>
-              <a:rPr lang="fr-FR" dirty="0"/>
-              <a:t>(program, 0,..) </a:t>
-            </a:r>
-            <a:r>
-              <a:rPr lang="fr-FR" dirty="0" smtClean="0"/>
-              <a:t>;</a:t>
-            </a:r>
-            <a:endParaRPr lang="fr-FR" dirty="0"/>
-          </a:p>
-          <a:p>
-            <a:pPr lvl="2"/>
-            <a:endParaRPr lang="fr-FR" dirty="0"/>
-          </a:p>
-          <a:p>
-            <a:r>
-              <a:rPr lang="fr-FR" dirty="0"/>
-              <a:t>Création des </a:t>
+              <a:t>cl_int</a:t>
+            </a:r>
+            <a:r>
+              <a:rPr lang="fr-FR" dirty="0"/>
+              <a:t> </a:t>
+            </a:r>
+            <a:r>
+              <a:rPr lang="fr-FR" dirty="0" err="1"/>
+              <a:t>clSetKernelArg</a:t>
+            </a:r>
+            <a:r>
+              <a:rPr lang="fr-FR" dirty="0"/>
+              <a:t> (</a:t>
+            </a:r>
+            <a:r>
+              <a:rPr lang="fr-FR" dirty="0" err="1"/>
+              <a:t>kernel</a:t>
+            </a:r>
+            <a:r>
+              <a:rPr lang="fr-FR" dirty="0"/>
+              <a:t>, </a:t>
+            </a:r>
+            <a:r>
+              <a:rPr lang="fr-FR" dirty="0" err="1"/>
+              <a:t>arg_index</a:t>
+            </a:r>
+            <a:r>
+              <a:rPr lang="fr-FR" dirty="0"/>
+              <a:t>, </a:t>
+            </a:r>
+            <a:r>
+              <a:rPr lang="fr-FR" dirty="0" err="1"/>
+              <a:t>arg_size</a:t>
+            </a:r>
+            <a:r>
+              <a:rPr lang="fr-FR" dirty="0"/>
+              <a:t>, *</a:t>
+            </a:r>
+            <a:r>
+              <a:rPr lang="fr-FR" dirty="0" err="1"/>
+              <a:t>arg_value</a:t>
+            </a:r>
+            <a:r>
+              <a:rPr lang="fr-FR" dirty="0"/>
+              <a:t>) </a:t>
+            </a:r>
+          </a:p>
+          <a:p>
+            <a:pPr lvl="1"/>
+            <a:endParaRPr lang="fr-FR" dirty="0"/>
+          </a:p>
+          <a:p>
+            <a:r>
+              <a:rPr lang="fr-FR" dirty="0"/>
+              <a:t>Déploiement des </a:t>
             </a:r>
             <a:r>
               <a:rPr lang="fr-FR" dirty="0" err="1"/>
               <a:t>kernels</a:t>
             </a:r>
-            <a:endParaRPr lang="fr-FR" dirty="0"/>
-          </a:p>
-          <a:p>
-            <a:pPr lvl="1"/>
-            <a:r>
-              <a:rPr lang="fr-FR" dirty="0" smtClean="0"/>
-              <a:t>Noyaux de calculs</a:t>
-            </a:r>
-          </a:p>
-          <a:p>
-            <a:pPr lvl="1"/>
-            <a:r>
-              <a:rPr lang="fr-FR" dirty="0" smtClean="0"/>
-              <a:t>Création des </a:t>
-            </a:r>
-            <a:r>
-              <a:rPr lang="fr-FR" i="1" dirty="0" err="1" smtClean="0"/>
-              <a:t>cl_kernel</a:t>
-            </a:r>
-            <a:r>
-              <a:rPr lang="fr-FR" i="1" dirty="0" smtClean="0"/>
-              <a:t> </a:t>
-            </a:r>
-            <a:r>
-              <a:rPr lang="fr-FR" dirty="0" smtClean="0"/>
-              <a:t>à partir des </a:t>
-            </a:r>
-            <a:r>
-              <a:rPr lang="fr-FR" dirty="0" err="1" smtClean="0"/>
-              <a:t>prgorammes</a:t>
-            </a:r>
-            <a:r>
-              <a:rPr lang="fr-FR" dirty="0" smtClean="0"/>
-              <a:t> précédents</a:t>
+            <a:r>
+              <a:rPr lang="fr-FR" dirty="0"/>
+              <a:t> pour </a:t>
+            </a:r>
+            <a:r>
+              <a:rPr lang="fr-FR" dirty="0" smtClean="0"/>
+              <a:t>l’exécution</a:t>
             </a:r>
           </a:p>
           <a:p>
@@ -15329,44 +15615,95 @@
             </a:pPr>
             <a:r>
               <a:rPr lang="fr-FR" dirty="0" err="1"/>
+              <a:t>clEnqueueNDRangeKernel</a:t>
+            </a:r>
+            <a:r>
+              <a:rPr lang="fr-FR" dirty="0"/>
+              <a:t>(</a:t>
+            </a:r>
+            <a:r>
+              <a:rPr lang="fr-FR" dirty="0" err="1"/>
+              <a:t>command_queue</a:t>
+            </a:r>
+            <a:r>
+              <a:rPr lang="fr-FR" dirty="0"/>
+              <a:t>, </a:t>
+            </a:r>
+            <a:r>
+              <a:rPr lang="fr-FR" dirty="0" err="1"/>
               <a:t>kernel</a:t>
             </a:r>
             <a:r>
               <a:rPr lang="fr-FR" dirty="0"/>
-              <a:t> = </a:t>
+              <a:t>, 1, NULL, &amp;</a:t>
             </a:r>
             <a:r>
               <a:rPr lang="fr-FR" dirty="0" err="1"/>
-              <a:t>clCreateKernel</a:t>
-            </a:r>
-            <a:r>
-              <a:rPr lang="fr-FR" dirty="0"/>
-              <a:t>(program, "</a:t>
+              <a:t>global_size</a:t>
+            </a:r>
+            <a:r>
+              <a:rPr lang="fr-FR" dirty="0"/>
+              <a:t>, &amp;</a:t>
             </a:r>
             <a:r>
               <a:rPr lang="fr-FR" dirty="0" err="1"/>
-              <a:t>kernel_name</a:t>
-            </a:r>
-            <a:r>
-              <a:rPr lang="fr-FR" dirty="0"/>
-              <a:t>", &amp;</a:t>
-            </a:r>
-            <a:r>
-              <a:rPr lang="fr-FR" dirty="0" err="1"/>
-              <a:t>err</a:t>
-            </a:r>
-            <a:r>
-              <a:rPr lang="fr-FR" dirty="0"/>
-              <a:t>) </a:t>
+              <a:t>local_size</a:t>
+            </a:r>
+            <a:r>
+              <a:rPr lang="fr-FR" dirty="0"/>
+              <a:t>, 0, NULL, NULL); </a:t>
+            </a:r>
+            <a:endParaRPr lang="fr-FR" dirty="0" smtClean="0"/>
+          </a:p>
+          <a:p>
+            <a:pPr marL="1371600" lvl="3" indent="0">
+              <a:buNone/>
+            </a:pPr>
+            <a:r>
+              <a:rPr lang="fr-FR" dirty="0" err="1" smtClean="0"/>
+              <a:t>global_size</a:t>
+            </a:r>
+            <a:r>
+              <a:rPr lang="fr-FR" dirty="0" smtClean="0"/>
+              <a:t> </a:t>
+            </a:r>
+            <a:r>
+              <a:rPr lang="fr-FR" dirty="0"/>
+              <a:t>= TOTAL_NUM_THREADS</a:t>
             </a:r>
             <a:r>
               <a:rPr lang="fr-FR" dirty="0" smtClean="0"/>
               <a:t>;</a:t>
             </a:r>
+          </a:p>
+          <a:p>
+            <a:pPr marL="1371600" lvl="3" indent="0">
+              <a:buNone/>
+            </a:pPr>
+            <a:r>
+              <a:rPr lang="fr-FR" dirty="0" err="1" smtClean="0"/>
+              <a:t>local_size</a:t>
+            </a:r>
+            <a:r>
+              <a:rPr lang="fr-FR" dirty="0" smtClean="0"/>
+              <a:t> </a:t>
+            </a:r>
+            <a:r>
+              <a:rPr lang="fr-FR" dirty="0"/>
+              <a:t>= WORKGROUP_SIZE; </a:t>
+            </a:r>
+          </a:p>
+          <a:p>
+            <a:pPr marL="914400" lvl="2" indent="0">
+              <a:buNone/>
+            </a:pPr>
             <a:endParaRPr lang="fr-FR" dirty="0"/>
           </a:p>
           <a:p>
             <a:pPr lvl="2"/>
+            <a:endParaRPr lang="fr-FR" dirty="0"/>
+          </a:p>
+          <a:p>
             <a:endParaRPr lang="fr-FR" dirty="0"/>
           </a:p>
         </p:txBody>
@@ -15433,9 +15770,9 @@
           <a:bodyPr/>
           <a:lstStyle/>
           <a:p>
-            <a:fld id="{BC286C36-F388-D843-9417-6D205DF11E23}" type="datetime1">
+            <a:fld id="{8E5A4F09-7DBC-A846-8D19-49203D2629F8}" type="datetime1">
               <a:rPr lang="fr-FR" smtClean="0"/>
-              <a:t>07/09/15</a:t>
+              <a:t>18/09/15</a:t>
             </a:fld>
             <a:endParaRPr lang="fr-FR" dirty="0"/>
           </a:p>
@@ -15444,7 +15781,7 @@
     </p:spTree>
     <p:extLst>
       <p:ext uri="{BB962C8B-B14F-4D97-AF65-F5344CB8AC3E}">
-        <p14:creationId xmlns:p14="http://schemas.microsoft.com/office/powerpoint/2010/main" val="3085525198"/>
+        <p14:creationId xmlns:p14="http://schemas.microsoft.com/office/powerpoint/2010/main" val="1860287714"/>
       </p:ext>
     </p:extLst>
   </p:cSld>
@@ -15503,42 +15840,33 @@
         <p:spPr/>
         <p:txBody>
           <a:bodyPr>
-            <a:normAutofit fontScale="85000" lnSpcReduction="10000"/>
+            <a:normAutofit fontScale="92500" lnSpcReduction="20000"/>
           </a:bodyPr>
           <a:lstStyle/>
           <a:p>
             <a:r>
               <a:rPr lang="fr-FR" dirty="0"/>
-              <a:t>Création de la queue de commande pour le </a:t>
-            </a:r>
-            <a:r>
-              <a:rPr lang="fr-FR" dirty="0" smtClean="0"/>
-              <a:t>matériel</a:t>
+              <a:t>Déplacement des résultats vers la mémoire </a:t>
+            </a:r>
+            <a:r>
+              <a:rPr lang="fr-FR" dirty="0" smtClean="0"/>
+              <a:t>hôte</a:t>
             </a:r>
           </a:p>
           <a:p>
             <a:pPr lvl="1"/>
             <a:r>
               <a:rPr lang="fr-FR" dirty="0" smtClean="0"/>
-              <a:t>Chaque queue est attaché à un matériel</a:t>
-            </a:r>
-          </a:p>
-          <a:p>
-            <a:pPr lvl="2"/>
-            <a:r>
-              <a:rPr lang="fr-FR" dirty="0" smtClean="0"/>
               <a:t>Méthode:</a:t>
             </a:r>
           </a:p>
           <a:p>
-            <a:pPr lvl="3"/>
-            <a:r>
-              <a:rPr lang="fr-FR" dirty="0"/>
-              <a:t>queue = </a:t>
-            </a:r>
+            <a:pPr marL="914400" lvl="2" indent="0">
+              <a:buNone/>
+            </a:pPr>
             <a:r>
               <a:rPr lang="fr-FR" dirty="0" err="1"/>
-              <a:t>clCreateCommandQueue</a:t>
+              <a:t>clEnqueueReadBuffer</a:t>
             </a:r>
             <a:r>
               <a:rPr lang="fr-FR" dirty="0"/>
@@ -15546,150 +15874,140 @@
             </a:r>
             <a:r>
               <a:rPr lang="fr-FR" dirty="0" err="1"/>
-              <a:t>context</a:t>
+              <a:t>command_queue</a:t>
             </a:r>
             <a:r>
               <a:rPr lang="fr-FR" dirty="0"/>
               <a:t>, </a:t>
             </a:r>
-            <a:r>
-              <a:rPr lang="fr-FR" dirty="0" err="1"/>
-              <a:t>device</a:t>
-            </a:r>
-            <a:r>
-              <a:rPr lang="fr-FR" dirty="0"/>
-              <a:t>, 0, &amp;</a:t>
-            </a:r>
-            <a:r>
-              <a:rPr lang="fr-FR" dirty="0" err="1" smtClean="0"/>
-              <a:t>err</a:t>
-            </a:r>
-            <a:r>
-              <a:rPr lang="fr-FR" dirty="0" smtClean="0"/>
-              <a:t>); </a:t>
-            </a:r>
-            <a:endParaRPr lang="fr-FR" dirty="0"/>
-          </a:p>
-          <a:p>
-            <a:pPr lvl="3"/>
-            <a:endParaRPr lang="fr-FR" dirty="0" smtClean="0"/>
-          </a:p>
-          <a:p>
-            <a:r>
-              <a:rPr lang="fr-FR" dirty="0" smtClean="0"/>
-              <a:t>Allocation </a:t>
-            </a:r>
-            <a:r>
-              <a:rPr lang="fr-FR" dirty="0"/>
-              <a:t>de la mémoire/ déplacement des </a:t>
-            </a:r>
-            <a:r>
-              <a:rPr lang="fr-FR" dirty="0" smtClean="0"/>
-              <a:t>données</a:t>
-            </a:r>
-          </a:p>
-          <a:p>
-            <a:pPr lvl="1"/>
-            <a:r>
-              <a:rPr lang="fr-FR" dirty="0" smtClean="0"/>
-              <a:t>Méthode:</a:t>
-            </a:r>
-          </a:p>
-          <a:p>
-            <a:pPr lvl="2"/>
             <a:r>
               <a:rPr lang="fr-FR" dirty="0" err="1"/>
               <a:t>memObject</a:t>
             </a:r>
             <a:r>
               <a:rPr lang="fr-FR" dirty="0"/>
-              <a:t> = </a:t>
+              <a:t>, </a:t>
             </a:r>
             <a:r>
               <a:rPr lang="fr-FR" dirty="0" err="1"/>
-              <a:t>clCreateBuffer</a:t>
-            </a:r>
-            <a:r>
-              <a:rPr lang="fr-FR" dirty="0"/>
-              <a:t> (</a:t>
+              <a:t>blocking_read</a:t>
+            </a:r>
+            <a:r>
+              <a:rPr lang="fr-FR" dirty="0"/>
+              <a:t>, offset, TOTAL_SIZE, </a:t>
             </a:r>
             <a:r>
               <a:rPr lang="fr-FR" dirty="0" err="1"/>
-              <a:t>context</a:t>
-            </a:r>
-            <a:r>
-              <a:rPr lang="fr-FR" dirty="0"/>
-              <a:t>, NULL, SIZE_N, NULL, &amp;</a:t>
+              <a:t>hostPointer</a:t>
+            </a:r>
+            <a:r>
+              <a:rPr lang="fr-FR" dirty="0"/>
+              <a:t>, 0, NULL, NULL) </a:t>
+            </a:r>
+          </a:p>
+          <a:p>
+            <a:pPr lvl="2"/>
+            <a:endParaRPr lang="fr-FR" dirty="0"/>
+          </a:p>
+          <a:p>
+            <a:r>
+              <a:rPr lang="fr-FR" dirty="0"/>
+              <a:t>Relâchement du contexte, programme, </a:t>
             </a:r>
             <a:r>
               <a:rPr lang="fr-FR" dirty="0" err="1"/>
-              <a:t>err</a:t>
-            </a:r>
-            <a:r>
-              <a:rPr lang="fr-FR" dirty="0"/>
-              <a:t>) </a:t>
+              <a:t>kernel</a:t>
+            </a:r>
+            <a:r>
+              <a:rPr lang="fr-FR" dirty="0"/>
+              <a:t> et mémoire</a:t>
+            </a:r>
+            <a:r>
+              <a:rPr lang="fr-FR" dirty="0" smtClean="0"/>
+              <a:t>.</a:t>
+            </a:r>
+          </a:p>
+          <a:p>
+            <a:pPr lvl="1"/>
+            <a:r>
+              <a:rPr lang="fr-FR" dirty="0" smtClean="0"/>
+              <a:t>Méthode:</a:t>
             </a:r>
           </a:p>
           <a:p>
             <a:pPr lvl="2"/>
             <a:r>
-              <a:rPr lang="fr-FR" dirty="0" err="1" smtClean="0"/>
-              <a:t>clEnqueueWriteBuffer</a:t>
+              <a:rPr lang="fr-FR" dirty="0" err="1"/>
+              <a:t>clReleaseMemObject</a:t>
             </a:r>
             <a:r>
               <a:rPr lang="fr-FR" dirty="0"/>
               <a:t>(</a:t>
-            </a:r>
-            <a:r>
-              <a:rPr lang="fr-FR" dirty="0" err="1"/>
-              <a:t>command_queue</a:t>
-            </a:r>
-            <a:r>
-              <a:rPr lang="fr-FR" dirty="0"/>
-              <a:t>, </a:t>
             </a:r>
             <a:r>
               <a:rPr lang="fr-FR" dirty="0" err="1"/>
               <a:t>memObject</a:t>
             </a:r>
             <a:r>
-              <a:rPr lang="fr-FR" dirty="0"/>
-              <a:t>, ..., TOTAL_SIZE, </a:t>
+              <a:rPr lang="fr-FR" dirty="0" smtClean="0"/>
+              <a:t>)</a:t>
+            </a:r>
+            <a:endParaRPr lang="fr-FR" dirty="0"/>
+          </a:p>
+          <a:p>
+            <a:pPr lvl="2"/>
+            <a:r>
+              <a:rPr lang="fr-FR" dirty="0" err="1" smtClean="0"/>
+              <a:t>clReleaseKernel</a:t>
+            </a:r>
+            <a:r>
+              <a:rPr lang="fr-FR" dirty="0"/>
+              <a:t>(</a:t>
             </a:r>
             <a:r>
               <a:rPr lang="fr-FR" dirty="0" err="1"/>
-              <a:t>hostPointer</a:t>
-            </a:r>
-            <a:r>
-              <a:rPr lang="fr-FR" dirty="0"/>
-              <a:t>, ...) </a:t>
+              <a:t>kernel</a:t>
+            </a:r>
+            <a:r>
+              <a:rPr lang="fr-FR" dirty="0" smtClean="0"/>
+              <a:t>)</a:t>
+            </a:r>
+            <a:endParaRPr lang="fr-FR" dirty="0"/>
+          </a:p>
+          <a:p>
+            <a:pPr lvl="2"/>
+            <a:r>
+              <a:rPr lang="fr-FR" dirty="0" err="1" smtClean="0"/>
+              <a:t>clReleaseProgram</a:t>
+            </a:r>
+            <a:r>
+              <a:rPr lang="fr-FR" dirty="0"/>
+              <a:t>(program) </a:t>
             </a:r>
             <a:endParaRPr lang="fr-FR" dirty="0" smtClean="0"/>
           </a:p>
           <a:p>
-            <a:pPr lvl="1"/>
-            <a:r>
-              <a:rPr lang="fr-FR" dirty="0" smtClean="0"/>
-              <a:t>La mémoire peut être stocké en buffer ou en images.</a:t>
-            </a:r>
-          </a:p>
-          <a:p>
             <a:pPr lvl="2"/>
             <a:r>
-              <a:rPr lang="fr-FR" dirty="0" smtClean="0"/>
-              <a:t>Mémoire contigu</a:t>
-            </a:r>
+              <a:rPr lang="fr-FR" dirty="0" err="1" smtClean="0"/>
+              <a:t>clReleaseContext</a:t>
+            </a:r>
+            <a:r>
+              <a:rPr lang="fr-FR" dirty="0" smtClean="0"/>
+              <a:t>(</a:t>
+            </a:r>
+            <a:r>
+              <a:rPr lang="fr-FR" dirty="0" err="1" smtClean="0"/>
+              <a:t>context</a:t>
+            </a:r>
+            <a:r>
+              <a:rPr lang="fr-FR" dirty="0" smtClean="0"/>
+              <a:t>)</a:t>
+            </a:r>
+            <a:endParaRPr lang="fr-FR" dirty="0"/>
           </a:p>
           <a:p>
             <a:pPr lvl="2"/>
-            <a:r>
-              <a:rPr lang="fr-FR" dirty="0" smtClean="0"/>
-              <a:t>Possibilité de lecture / écriture</a:t>
-            </a:r>
-            <a:endParaRPr lang="fr-FR" dirty="0"/>
-          </a:p>
-          <a:p>
-            <a:pPr lvl="1"/>
             <a:endParaRPr lang="fr-FR" dirty="0"/>
           </a:p>
         </p:txBody>
@@ -15756,9 +16074,9 @@
           <a:bodyPr/>
           <a:lstStyle/>
           <a:p>
-            <a:fld id="{19CFA63D-2380-9F4A-A770-BF0454DD5ABF}" type="datetime1">
+            <a:fld id="{7430C012-EA7C-9A4D-A02D-9FF3BC0756DE}" type="datetime1">
               <a:rPr lang="fr-FR" smtClean="0"/>
-              <a:t>07/09/15</a:t>
+              <a:t>18/09/15</a:t>
             </a:fld>
             <a:endParaRPr lang="fr-FR" dirty="0"/>
           </a:p>
@@ -15767,7 +16085,7 @@
     </p:spTree>
     <p:extLst>
       <p:ext uri="{BB962C8B-B14F-4D97-AF65-F5344CB8AC3E}">
-        <p14:creationId xmlns:p14="http://schemas.microsoft.com/office/powerpoint/2010/main" val="9922291"/>
+        <p14:creationId xmlns:p14="http://schemas.microsoft.com/office/powerpoint/2010/main" val="1235569647"/>
       </p:ext>
     </p:extLst>
   </p:cSld>
@@ -15809,221 +16127,6 @@
           <a:bodyPr/>
           <a:lstStyle/>
           <a:p>
-            <a:endParaRPr lang="fr-FR"/>
-          </a:p>
-        </p:txBody>
-      </p:sp>
-      <p:sp>
-        <p:nvSpPr>
-          <p:cNvPr id="3" name="Espace réservé du contenu 2"/>
-          <p:cNvSpPr>
-            <a:spLocks noGrp="1"/>
-          </p:cNvSpPr>
-          <p:nvPr>
-            <p:ph idx="1"/>
-          </p:nvPr>
-        </p:nvSpPr>
-        <p:spPr/>
-        <p:txBody>
-          <a:bodyPr>
-            <a:normAutofit lnSpcReduction="10000"/>
-          </a:bodyPr>
-          <a:lstStyle/>
-          <a:p>
-            <a:r>
-              <a:rPr lang="fr-FR" dirty="0"/>
-              <a:t>Association des arguments aux </a:t>
-            </a:r>
-            <a:r>
-              <a:rPr lang="fr-FR" dirty="0" err="1" smtClean="0"/>
-              <a:t>kernels</a:t>
-            </a:r>
-            <a:endParaRPr lang="fr-FR" dirty="0" smtClean="0"/>
-          </a:p>
-          <a:p>
-            <a:pPr lvl="1"/>
-            <a:r>
-              <a:rPr lang="fr-FR" dirty="0" smtClean="0"/>
-              <a:t>Méthode:</a:t>
-            </a:r>
-          </a:p>
-          <a:p>
-            <a:pPr marL="914400" lvl="2" indent="0">
-              <a:buNone/>
-            </a:pPr>
-            <a:r>
-              <a:rPr lang="fr-FR" dirty="0" err="1"/>
-              <a:t>cl_int</a:t>
-            </a:r>
-            <a:r>
-              <a:rPr lang="fr-FR" dirty="0"/>
-              <a:t> </a:t>
-            </a:r>
-            <a:r>
-              <a:rPr lang="fr-FR" dirty="0" err="1"/>
-              <a:t>clSetKernelArg</a:t>
-            </a:r>
-            <a:r>
-              <a:rPr lang="fr-FR" dirty="0"/>
-              <a:t> (</a:t>
-            </a:r>
-            <a:r>
-              <a:rPr lang="fr-FR" dirty="0" err="1"/>
-              <a:t>kernel</a:t>
-            </a:r>
-            <a:r>
-              <a:rPr lang="fr-FR" dirty="0"/>
-              <a:t>, </a:t>
-            </a:r>
-            <a:r>
-              <a:rPr lang="fr-FR" dirty="0" err="1"/>
-              <a:t>arg_index</a:t>
-            </a:r>
-            <a:r>
-              <a:rPr lang="fr-FR" dirty="0"/>
-              <a:t>, </a:t>
-            </a:r>
-            <a:r>
-              <a:rPr lang="fr-FR" dirty="0" err="1"/>
-              <a:t>arg_size</a:t>
-            </a:r>
-            <a:r>
-              <a:rPr lang="fr-FR" dirty="0"/>
-              <a:t>, *</a:t>
-            </a:r>
-            <a:r>
-              <a:rPr lang="fr-FR" dirty="0" err="1"/>
-              <a:t>arg_value</a:t>
-            </a:r>
-            <a:r>
-              <a:rPr lang="fr-FR" dirty="0"/>
-              <a:t>) </a:t>
-            </a:r>
-          </a:p>
-          <a:p>
-            <a:pPr lvl="1"/>
-            <a:endParaRPr lang="fr-FR" dirty="0"/>
-          </a:p>
-          <a:p>
-            <a:r>
-              <a:rPr lang="fr-FR" dirty="0"/>
-              <a:t>Déploiement des </a:t>
-            </a:r>
-            <a:r>
-              <a:rPr lang="fr-FR" dirty="0" err="1"/>
-              <a:t>kernels</a:t>
-            </a:r>
-            <a:r>
-              <a:rPr lang="fr-FR" dirty="0"/>
-              <a:t> pour </a:t>
-            </a:r>
-            <a:r>
-              <a:rPr lang="fr-FR" dirty="0" smtClean="0"/>
-              <a:t>l’exécution</a:t>
-            </a:r>
-          </a:p>
-          <a:p>
-            <a:pPr lvl="1"/>
-            <a:r>
-              <a:rPr lang="fr-FR" dirty="0" smtClean="0"/>
-              <a:t>Méthode:</a:t>
-            </a:r>
-          </a:p>
-          <a:p>
-            <a:pPr marL="914400" lvl="2" indent="0">
-              <a:buNone/>
-            </a:pPr>
-            <a:r>
-              <a:rPr lang="fr-FR" dirty="0" err="1"/>
-              <a:t>clEnqueueNDRangeKernel</a:t>
-            </a:r>
-            <a:r>
-              <a:rPr lang="fr-FR" dirty="0"/>
-              <a:t>(</a:t>
-            </a:r>
-            <a:r>
-              <a:rPr lang="fr-FR" dirty="0" err="1"/>
-              <a:t>command_queue</a:t>
-            </a:r>
-            <a:r>
-              <a:rPr lang="fr-FR" dirty="0"/>
-              <a:t>, </a:t>
-            </a:r>
-            <a:r>
-              <a:rPr lang="fr-FR" dirty="0" err="1"/>
-              <a:t>kernel</a:t>
-            </a:r>
-            <a:r>
-              <a:rPr lang="fr-FR" dirty="0"/>
-              <a:t>, 1, NULL, &amp;</a:t>
-            </a:r>
-            <a:r>
-              <a:rPr lang="fr-FR" dirty="0" err="1"/>
-              <a:t>global_size</a:t>
-            </a:r>
-            <a:r>
-              <a:rPr lang="fr-FR" dirty="0"/>
-              <a:t>, &amp;</a:t>
-            </a:r>
-            <a:r>
-              <a:rPr lang="fr-FR" dirty="0" err="1"/>
-              <a:t>local_size</a:t>
-            </a:r>
-            <a:r>
-              <a:rPr lang="fr-FR" dirty="0"/>
-              <a:t>, 0, NULL, NULL); </a:t>
-            </a:r>
-            <a:endParaRPr lang="fr-FR" dirty="0" smtClean="0"/>
-          </a:p>
-          <a:p>
-            <a:pPr marL="1371600" lvl="3" indent="0">
-              <a:buNone/>
-            </a:pPr>
-            <a:r>
-              <a:rPr lang="fr-FR" dirty="0" err="1" smtClean="0"/>
-              <a:t>global_size</a:t>
-            </a:r>
-            <a:r>
-              <a:rPr lang="fr-FR" dirty="0" smtClean="0"/>
-              <a:t> </a:t>
-            </a:r>
-            <a:r>
-              <a:rPr lang="fr-FR" dirty="0"/>
-              <a:t>= TOTAL_NUM_THREADS</a:t>
-            </a:r>
-            <a:r>
-              <a:rPr lang="fr-FR" dirty="0" smtClean="0"/>
-              <a:t>;</a:t>
-            </a:r>
-          </a:p>
-          <a:p>
-            <a:pPr marL="1371600" lvl="3" indent="0">
-              <a:buNone/>
-            </a:pPr>
-            <a:r>
-              <a:rPr lang="fr-FR" dirty="0" err="1" smtClean="0"/>
-              <a:t>local_size</a:t>
-            </a:r>
-            <a:r>
-              <a:rPr lang="fr-FR" dirty="0" smtClean="0"/>
-              <a:t> </a:t>
-            </a:r>
-            <a:r>
-              <a:rPr lang="fr-FR" dirty="0"/>
-              <a:t>= WORKGROUP_SIZE; </a:t>
-            </a:r>
-          </a:p>
-          <a:p>
-            <a:pPr marL="914400" lvl="2" indent="0">
-              <a:buNone/>
-            </a:pPr>
-            <a:endParaRPr lang="fr-FR" dirty="0"/>
-          </a:p>
-          <a:p>
-            <a:pPr lvl="2"/>
-            <a:endParaRPr lang="fr-FR" dirty="0"/>
-          </a:p>
-          <a:p>
             <a:endParaRPr lang="fr-FR" dirty="0"/>
           </a:p>
         </p:txBody>
@@ -16090,10 +16193,43 @@
           <a:bodyPr/>
           <a:lstStyle/>
           <a:p>
-            <a:fld id="{8E5A4F09-7DBC-A846-8D19-49203D2629F8}" type="datetime1">
+            <a:fld id="{8D77C602-9EB1-D548-9D4E-F0546BFFB4E1}" type="datetime1">
               <a:rPr lang="fr-FR" smtClean="0"/>
-              <a:t>07/09/15</a:t>
+              <a:t>18/09/15</a:t>
             </a:fld>
+            <a:endParaRPr lang="fr-FR" dirty="0"/>
+          </a:p>
+        </p:txBody>
+      </p:sp>
+      <p:sp>
+        <p:nvSpPr>
+          <p:cNvPr id="9" name="ZoneTexte 8"/>
+          <p:cNvSpPr txBox="1"/>
+          <p:nvPr/>
+        </p:nvSpPr>
+        <p:spPr>
+          <a:xfrm>
+            <a:off x="-10762" y="3179520"/>
+            <a:ext cx="9171089" cy="369332"/>
+          </a:xfrm>
+          <a:prstGeom prst="rect">
+            <a:avLst/>
+          </a:prstGeom>
+          <a:noFill/>
+        </p:spPr>
+        <p:txBody>
+          <a:bodyPr wrap="square" rtlCol="0">
+            <a:spAutoFit/>
+          </a:bodyPr>
+          <a:lstStyle/>
+          <a:p>
+            <a:pPr algn="ctr"/>
+            <a:r>
+              <a:rPr lang="fr-FR" dirty="0" smtClean="0">
+                <a:hlinkClick r:id="rId2" action="ppaction://hlinkfile"/>
+              </a:rPr>
+              <a:t>Un exemple</a:t>
+            </a:r>
             <a:endParaRPr lang="fr-FR" dirty="0"/>
           </a:p>
         </p:txBody>
@@ -16101,7 +16237,7 @@
     </p:spTree>
     <p:extLst>
       <p:ext uri="{BB962C8B-B14F-4D97-AF65-F5344CB8AC3E}">
-        <p14:creationId xmlns:p14="http://schemas.microsoft.com/office/powerpoint/2010/main" val="1860287714"/>
+        <p14:creationId xmlns:p14="http://schemas.microsoft.com/office/powerpoint/2010/main" val="473606431"/>
       </p:ext>
     </p:extLst>
   </p:cSld>
@@ -16314,7 +16450,7 @@
           <a:p>
             <a:fld id="{9998CCC0-B587-094F-88ED-55F446C942E0}" type="datetime1">
               <a:rPr lang="fr-FR" smtClean="0"/>
-              <a:t>07/09/15</a:t>
+              <a:t>18/09/15</a:t>
             </a:fld>
             <a:endParaRPr lang="fr-FR" dirty="0"/>
           </a:p>
@@ -16381,25 +16517,19 @@
         </p:nvSpPr>
         <p:spPr/>
         <p:txBody>
-          <a:bodyPr>
-            <a:normAutofit fontScale="92500" lnSpcReduction="20000"/>
-          </a:bodyPr>
-          <a:lstStyle/>
-          <a:p>
-            <a:r>
-              <a:rPr lang="fr-FR" dirty="0"/>
-              <a:t>Déplacement des résultats vers la mémoire </a:t>
-            </a:r>
-            <a:r>
-              <a:rPr lang="fr-FR" dirty="0" smtClean="0"/>
-              <a:t>hôte</a:t>
+          <a:bodyPr/>
+          <a:lstStyle/>
+          <a:p>
+            <a:r>
+              <a:rPr lang="fr-FR" dirty="0" smtClean="0"/>
+              <a:t>Pour aller plus loin:</a:t>
             </a:r>
           </a:p>
           <a:p>
             <a:pPr lvl="1"/>
             <a:r>
               <a:rPr lang="fr-FR" dirty="0" smtClean="0"/>
-              <a:t>Méthode:</a:t>
+              <a:t>Documentation OpenGL</a:t>
             </a:r>
           </a:p>
           <a:p>
@@ -16407,149 +16537,78 @@
               <a:buNone/>
             </a:pPr>
             <a:r>
+              <a:rPr lang="fr-FR" dirty="0"/>
+              <a:t>http://</a:t>
+            </a:r>
+            <a:r>
               <a:rPr lang="fr-FR" dirty="0" err="1"/>
-              <a:t>clEnqueueReadBuffer</a:t>
-            </a:r>
-            <a:r>
-              <a:rPr lang="fr-FR" dirty="0"/>
-              <a:t>(</a:t>
+              <a:t>www.opengl.org</a:t>
+            </a:r>
+            <a:r>
+              <a:rPr lang="fr-FR" dirty="0"/>
+              <a:t>/documentation/</a:t>
+            </a:r>
+            <a:endParaRPr lang="fr-FR" dirty="0" smtClean="0"/>
+          </a:p>
+          <a:p>
+            <a:pPr lvl="1"/>
+            <a:endParaRPr lang="fr-FR" dirty="0" smtClean="0"/>
+          </a:p>
+          <a:p>
+            <a:pPr lvl="1"/>
+            <a:r>
+              <a:rPr lang="fr-FR" dirty="0" smtClean="0"/>
+              <a:t>Documentation </a:t>
+            </a:r>
+            <a:r>
+              <a:rPr lang="fr-FR" dirty="0" err="1" smtClean="0"/>
+              <a:t>OpenCL</a:t>
+            </a:r>
+            <a:endParaRPr lang="fr-FR" dirty="0"/>
+          </a:p>
+          <a:p>
+            <a:pPr marL="914400" lvl="2" indent="0">
+              <a:buNone/>
+            </a:pPr>
+            <a:r>
+              <a:rPr lang="fr-FR" dirty="0"/>
+              <a:t>http://</a:t>
             </a:r>
             <a:r>
               <a:rPr lang="fr-FR" dirty="0" err="1"/>
-              <a:t>command_queue</a:t>
-            </a:r>
-            <a:r>
-              <a:rPr lang="fr-FR" dirty="0"/>
-              <a:t>, </a:t>
+              <a:t>www.khronos.org</a:t>
+            </a:r>
+            <a:r>
+              <a:rPr lang="fr-FR" dirty="0"/>
+              <a:t>/</a:t>
             </a:r>
             <a:r>
               <a:rPr lang="fr-FR" dirty="0" err="1"/>
-              <a:t>memObject</a:t>
-            </a:r>
-            <a:r>
-              <a:rPr lang="fr-FR" dirty="0"/>
-              <a:t>, </a:t>
+              <a:t>registry</a:t>
+            </a:r>
+            <a:r>
+              <a:rPr lang="fr-FR" dirty="0"/>
+              <a:t>/cl/</a:t>
             </a:r>
             <a:r>
               <a:rPr lang="fr-FR" dirty="0" err="1"/>
-              <a:t>blocking_read</a:t>
-            </a:r>
-            <a:r>
-              <a:rPr lang="fr-FR" dirty="0"/>
-              <a:t>, offset, TOTAL_SIZE, </a:t>
+              <a:t>sdk</a:t>
+            </a:r>
+            <a:r>
+              <a:rPr lang="fr-FR" dirty="0"/>
+              <a:t>/1.1/docs/man/</a:t>
             </a:r>
             <a:r>
               <a:rPr lang="fr-FR" dirty="0" err="1"/>
-              <a:t>hostPointer</a:t>
-            </a:r>
-            <a:r>
-              <a:rPr lang="fr-FR" dirty="0"/>
-              <a:t>, 0, NULL, NULL) </a:t>
-            </a:r>
-          </a:p>
-          <a:p>
-            <a:pPr lvl="2"/>
-            <a:endParaRPr lang="fr-FR" dirty="0"/>
-          </a:p>
-          <a:p>
-            <a:r>
-              <a:rPr lang="fr-FR" dirty="0"/>
-              <a:t>Relâchement du contexte, programme, </a:t>
-            </a:r>
-            <a:r>
-              <a:rPr lang="fr-FR" dirty="0" err="1"/>
-              <a:t>kernel</a:t>
-            </a:r>
-            <a:r>
-              <a:rPr lang="fr-FR" dirty="0"/>
-              <a:t> et mémoire</a:t>
-            </a:r>
-            <a:r>
-              <a:rPr lang="fr-FR" dirty="0" smtClean="0"/>
-              <a:t>.</a:t>
-            </a:r>
-          </a:p>
-          <a:p>
-            <a:pPr lvl="1"/>
-            <a:r>
-              <a:rPr lang="fr-FR" dirty="0" smtClean="0"/>
-              <a:t>Méthode:</a:t>
-            </a:r>
-          </a:p>
-          <a:p>
-            <a:pPr lvl="2"/>
-            <a:r>
-              <a:rPr lang="fr-FR" dirty="0" err="1"/>
-              <a:t>clReleaseMemObject</a:t>
-            </a:r>
-            <a:r>
-              <a:rPr lang="fr-FR" dirty="0"/>
-              <a:t>(</a:t>
-            </a:r>
-            <a:r>
-              <a:rPr lang="fr-FR" dirty="0" err="1"/>
-              <a:t>memObject</a:t>
-            </a:r>
-            <a:r>
-              <a:rPr lang="fr-FR" dirty="0" smtClean="0"/>
-              <a:t>)</a:t>
-            </a:r>
-            <a:endParaRPr lang="fr-FR" dirty="0"/>
-          </a:p>
-          <a:p>
-            <a:pPr lvl="2"/>
-            <a:r>
-              <a:rPr lang="fr-FR" dirty="0" err="1" smtClean="0"/>
-              <a:t>clReleaseKernel</a:t>
-            </a:r>
-            <a:r>
-              <a:rPr lang="fr-FR" dirty="0"/>
-              <a:t>(</a:t>
-            </a:r>
-            <a:r>
-              <a:rPr lang="fr-FR" dirty="0" err="1"/>
-              <a:t>kernel</a:t>
-            </a:r>
-            <a:r>
-              <a:rPr lang="fr-FR" dirty="0" smtClean="0"/>
-              <a:t>)</a:t>
-            </a:r>
-            <a:endParaRPr lang="fr-FR" dirty="0"/>
-          </a:p>
-          <a:p>
-            <a:pPr lvl="2"/>
-            <a:r>
-              <a:rPr lang="fr-FR" dirty="0" err="1" smtClean="0"/>
-              <a:t>clReleaseProgram</a:t>
-            </a:r>
-            <a:r>
-              <a:rPr lang="fr-FR" dirty="0"/>
-              <a:t>(program) </a:t>
+              <a:t>xhtml</a:t>
+            </a:r>
+            <a:r>
+              <a:rPr lang="fr-FR" dirty="0"/>
+              <a:t>/</a:t>
             </a:r>
             <a:endParaRPr lang="fr-FR" dirty="0" smtClean="0"/>
           </a:p>
           <a:p>
-            <a:pPr lvl="2"/>
-            <a:r>
-              <a:rPr lang="fr-FR" dirty="0" err="1" smtClean="0"/>
-              <a:t>clReleaseContext</a:t>
-            </a:r>
-            <a:r>
-              <a:rPr lang="fr-FR" dirty="0" smtClean="0"/>
-              <a:t>(</a:t>
-            </a:r>
-            <a:r>
-              <a:rPr lang="fr-FR" dirty="0" err="1" smtClean="0"/>
-              <a:t>context</a:t>
-            </a:r>
-            <a:r>
-              <a:rPr lang="fr-FR" dirty="0" smtClean="0"/>
-              <a:t>)</a:t>
-            </a:r>
-            <a:endParaRPr lang="fr-FR" dirty="0"/>
-          </a:p>
-          <a:p>
-            <a:pPr lvl="2"/>
             <a:endParaRPr lang="fr-FR" dirty="0"/>
           </a:p>
         </p:txBody>
@@ -16616,9 +16675,9 @@
           <a:bodyPr/>
           <a:lstStyle/>
           <a:p>
-            <a:fld id="{7430C012-EA7C-9A4D-A02D-9FF3BC0756DE}" type="datetime1">
+            <a:fld id="{A545BEB9-5B1B-DB4F-AD5C-E6F694244147}" type="datetime1">
               <a:rPr lang="fr-FR" smtClean="0"/>
-              <a:t>07/09/15</a:t>
+              <a:t>18/09/15</a:t>
             </a:fld>
             <a:endParaRPr lang="fr-FR" dirty="0"/>
           </a:p>
@@ -16627,7 +16686,7 @@
     </p:spTree>
     <p:extLst>
       <p:ext uri="{BB962C8B-B14F-4D97-AF65-F5344CB8AC3E}">
-        <p14:creationId xmlns:p14="http://schemas.microsoft.com/office/powerpoint/2010/main" val="1235569647"/>
+        <p14:creationId xmlns:p14="http://schemas.microsoft.com/office/powerpoint/2010/main" val="3716900625"/>
       </p:ext>
     </p:extLst>
   </p:cSld>
@@ -16656,7 +16715,7 @@
       </p:grpSpPr>
       <p:sp>
         <p:nvSpPr>
-          <p:cNvPr id="2" name="Titre 1"/>
+          <p:cNvPr id="7" name="Titre 6"/>
           <p:cNvSpPr>
             <a:spLocks noGrp="1"/>
           </p:cNvSpPr>
@@ -16669,13 +16728,56 @@
           <a:bodyPr/>
           <a:lstStyle/>
           <a:p>
-            <a:endParaRPr lang="fr-FR" dirty="0"/>
-          </a:p>
-        </p:txBody>
-      </p:sp>
-      <p:sp>
-        <p:nvSpPr>
-          <p:cNvPr id="4" name="Espace réservé du pied de page 3"/>
+            <a:endParaRPr lang="fr-FR"/>
+          </a:p>
+        </p:txBody>
+      </p:sp>
+      <p:sp>
+        <p:nvSpPr>
+          <p:cNvPr id="3" name="Espace réservé du contenu 2"/>
+          <p:cNvSpPr>
+            <a:spLocks noGrp="1"/>
+          </p:cNvSpPr>
+          <p:nvPr>
+            <p:ph idx="1"/>
+          </p:nvPr>
+        </p:nvSpPr>
+        <p:spPr/>
+        <p:txBody>
+          <a:bodyPr/>
+          <a:lstStyle/>
+          <a:p>
+            <a:r>
+              <a:rPr lang="fr-FR" dirty="0" smtClean="0"/>
+              <a:t>Et ….</a:t>
+            </a:r>
+          </a:p>
+          <a:p>
+            <a:r>
+              <a:rPr lang="fr-FR" dirty="0" smtClean="0"/>
+              <a:t>Maintenant …</a:t>
+            </a:r>
+          </a:p>
+          <a:p>
+            <a:endParaRPr lang="fr-FR" dirty="0"/>
+          </a:p>
+          <a:p>
+            <a:endParaRPr lang="fr-FR" dirty="0" smtClean="0"/>
+          </a:p>
+          <a:p>
+            <a:r>
+              <a:rPr lang="fr-FR" dirty="0" smtClean="0"/>
+              <a:t>Vous pouvez réaliser votre dernier commit pour le TP précédent.</a:t>
+            </a:r>
+          </a:p>
+          <a:p>
+            <a:endParaRPr lang="fr-FR" dirty="0"/>
+          </a:p>
+        </p:txBody>
+      </p:sp>
+      <p:sp>
+        <p:nvSpPr>
+          <p:cNvPr id="6" name="Espace réservé du pied de page 5"/>
           <p:cNvSpPr>
             <a:spLocks noGrp="1"/>
           </p:cNvSpPr>
@@ -16689,7 +16791,7 @@
           <a:lstStyle/>
           <a:p>
             <a:r>
-              <a:rPr lang="fr-FR" b="1" dirty="0" smtClean="0"/>
+              <a:rPr lang="fr-FR" dirty="0" smtClean="0"/>
               <a:t>Rémi Ronfard - GMIN317 – GPU </a:t>
             </a:r>
             <a:endParaRPr lang="fr-FR" b="1" dirty="0"/>
@@ -16698,7 +16800,7 @@
       </p:sp>
       <p:sp>
         <p:nvSpPr>
-          <p:cNvPr id="5" name="Espace réservé du numéro de diapositive 4"/>
+          <p:cNvPr id="4" name="Espace réservé du numéro de diapositive 3"/>
           <p:cNvSpPr>
             <a:spLocks noGrp="1"/>
           </p:cNvSpPr>
@@ -16722,7 +16824,7 @@
       </p:sp>
       <p:sp>
         <p:nvSpPr>
-          <p:cNvPr id="6" name="Espace réservé de la date 5"/>
+          <p:cNvPr id="5" name="Espace réservé de la date 4"/>
           <p:cNvSpPr>
             <a:spLocks noGrp="1"/>
           </p:cNvSpPr>
@@ -16735,43 +16837,10 @@
           <a:bodyPr/>
           <a:lstStyle/>
           <a:p>
-            <a:fld id="{8D77C602-9EB1-D548-9D4E-F0546BFFB4E1}" type="datetime1">
+            <a:fld id="{7EFCF959-3884-8E4E-A16A-44DD36307CD3}" type="datetime1">
               <a:rPr lang="fr-FR" smtClean="0"/>
-              <a:t>07/09/15</a:t>
+              <a:t>18/09/15</a:t>
             </a:fld>
-            <a:endParaRPr lang="fr-FR" dirty="0"/>
-          </a:p>
-        </p:txBody>
-      </p:sp>
-      <p:sp>
-        <p:nvSpPr>
-          <p:cNvPr id="9" name="ZoneTexte 8"/>
-          <p:cNvSpPr txBox="1"/>
-          <p:nvPr/>
-        </p:nvSpPr>
-        <p:spPr>
-          <a:xfrm>
-            <a:off x="-10762" y="3179520"/>
-            <a:ext cx="9171089" cy="369332"/>
-          </a:xfrm>
-          <a:prstGeom prst="rect">
-            <a:avLst/>
-          </a:prstGeom>
-          <a:noFill/>
-        </p:spPr>
-        <p:txBody>
-          <a:bodyPr wrap="square" rtlCol="0">
-            <a:spAutoFit/>
-          </a:bodyPr>
-          <a:lstStyle/>
-          <a:p>
-            <a:pPr algn="ctr"/>
-            <a:r>
-              <a:rPr lang="fr-FR" dirty="0" smtClean="0">
-                <a:hlinkClick r:id="rId2" action="ppaction://hlinkfile"/>
-              </a:rPr>
-              <a:t>Un exemple</a:t>
-            </a:r>
             <a:endParaRPr lang="fr-FR" dirty="0"/>
           </a:p>
         </p:txBody>
@@ -16779,7 +16848,7 @@
     </p:spTree>
     <p:extLst>
       <p:ext uri="{BB962C8B-B14F-4D97-AF65-F5344CB8AC3E}">
-        <p14:creationId xmlns:p14="http://schemas.microsoft.com/office/powerpoint/2010/main" val="473606431"/>
+        <p14:creationId xmlns:p14="http://schemas.microsoft.com/office/powerpoint/2010/main" val="2821294846"/>
       </p:ext>
     </p:extLst>
   </p:cSld>
@@ -16808,7 +16877,7 @@
       </p:grpSpPr>
       <p:sp>
         <p:nvSpPr>
-          <p:cNvPr id="2" name="Titre 1"/>
+          <p:cNvPr id="7" name="Titre 6"/>
           <p:cNvSpPr>
             <a:spLocks noGrp="1"/>
           </p:cNvSpPr>
@@ -16837,105 +16906,23 @@
         </p:nvSpPr>
         <p:spPr/>
         <p:txBody>
-          <a:bodyPr/>
-          <a:lstStyle/>
-          <a:p>
-            <a:r>
-              <a:rPr lang="fr-FR" dirty="0" smtClean="0"/>
-              <a:t>Pour aller plus loin:</a:t>
-            </a:r>
-          </a:p>
-          <a:p>
-            <a:pPr lvl="1"/>
-            <a:r>
-              <a:rPr lang="fr-FR" dirty="0" smtClean="0"/>
-              <a:t>Documentation OpenGL</a:t>
-            </a:r>
-          </a:p>
-          <a:p>
-            <a:pPr marL="914400" lvl="2" indent="0">
+          <a:bodyPr anchor="ctr"/>
+          <a:lstStyle/>
+          <a:p>
+            <a:pPr marL="0" indent="0" algn="ctr">
               <a:buNone/>
             </a:pPr>
             <a:r>
-              <a:rPr lang="fr-FR" dirty="0"/>
-              <a:t>http://</a:t>
-            </a:r>
-            <a:r>
-              <a:rPr lang="fr-FR" dirty="0" err="1"/>
-              <a:t>www.opengl.org</a:t>
-            </a:r>
-            <a:r>
-              <a:rPr lang="fr-FR" dirty="0"/>
-              <a:t>/documentation/</a:t>
-            </a:r>
-            <a:endParaRPr lang="fr-FR" dirty="0" smtClean="0"/>
-          </a:p>
-          <a:p>
-            <a:pPr lvl="1"/>
-            <a:endParaRPr lang="fr-FR" dirty="0" smtClean="0"/>
-          </a:p>
-          <a:p>
-            <a:pPr lvl="1"/>
-            <a:r>
-              <a:rPr lang="fr-FR" dirty="0" smtClean="0"/>
-              <a:t>Documentation </a:t>
-            </a:r>
-            <a:r>
-              <a:rPr lang="fr-FR" dirty="0" err="1" smtClean="0"/>
-              <a:t>OpenCL</a:t>
-            </a:r>
-            <a:endParaRPr lang="fr-FR" dirty="0"/>
-          </a:p>
-          <a:p>
-            <a:pPr marL="914400" lvl="2" indent="0">
-              <a:buNone/>
-            </a:pPr>
-            <a:r>
-              <a:rPr lang="fr-FR" dirty="0"/>
-              <a:t>http://</a:t>
-            </a:r>
-            <a:r>
-              <a:rPr lang="fr-FR" dirty="0" err="1"/>
-              <a:t>www.khronos.org</a:t>
-            </a:r>
-            <a:r>
-              <a:rPr lang="fr-FR" dirty="0"/>
-              <a:t>/</a:t>
-            </a:r>
-            <a:r>
-              <a:rPr lang="fr-FR" dirty="0" err="1"/>
-              <a:t>registry</a:t>
-            </a:r>
-            <a:r>
-              <a:rPr lang="fr-FR" dirty="0"/>
-              <a:t>/cl/</a:t>
-            </a:r>
-            <a:r>
-              <a:rPr lang="fr-FR" dirty="0" err="1"/>
-              <a:t>sdk</a:t>
-            </a:r>
-            <a:r>
-              <a:rPr lang="fr-FR" dirty="0"/>
-              <a:t>/1.1/docs/man/</a:t>
-            </a:r>
-            <a:r>
-              <a:rPr lang="fr-FR" dirty="0" err="1"/>
-              <a:t>xhtml</a:t>
-            </a:r>
-            <a:r>
-              <a:rPr lang="fr-FR" dirty="0"/>
-              <a:t>/</a:t>
-            </a:r>
-            <a:endParaRPr lang="fr-FR" dirty="0" smtClean="0"/>
-          </a:p>
-          <a:p>
-            <a:endParaRPr lang="fr-FR" dirty="0"/>
-          </a:p>
-        </p:txBody>
-      </p:sp>
-      <p:sp>
-        <p:nvSpPr>
-          <p:cNvPr id="4" name="Espace réservé du pied de page 3"/>
+              <a:rPr lang="fr-FR" dirty="0" smtClean="0"/>
+              <a:t>TP</a:t>
+            </a:r>
+            <a:endParaRPr lang="fr-FR" dirty="0"/>
+          </a:p>
+        </p:txBody>
+      </p:sp>
+      <p:sp>
+        <p:nvSpPr>
+          <p:cNvPr id="6" name="Espace réservé du pied de page 5"/>
           <p:cNvSpPr>
             <a:spLocks noGrp="1"/>
           </p:cNvSpPr>
@@ -16949,7 +16936,7 @@
           <a:lstStyle/>
           <a:p>
             <a:r>
-              <a:rPr lang="fr-FR" b="1" dirty="0" smtClean="0"/>
+              <a:rPr lang="fr-FR" dirty="0" smtClean="0"/>
               <a:t>Rémi Ronfard - GMIN317 – GPU </a:t>
             </a:r>
             <a:endParaRPr lang="fr-FR" b="1" dirty="0"/>
@@ -16958,7 +16945,7 @@
       </p:sp>
       <p:sp>
         <p:nvSpPr>
-          <p:cNvPr id="5" name="Espace réservé du numéro de diapositive 4"/>
+          <p:cNvPr id="4" name="Espace réservé du numéro de diapositive 3"/>
           <p:cNvSpPr>
             <a:spLocks noGrp="1"/>
           </p:cNvSpPr>
@@ -16982,313 +16969,6 @@
       </p:sp>
       <p:sp>
         <p:nvSpPr>
-          <p:cNvPr id="6" name="Espace réservé de la date 5"/>
-          <p:cNvSpPr>
-            <a:spLocks noGrp="1"/>
-          </p:cNvSpPr>
-          <p:nvPr>
-            <p:ph type="dt" sz="half" idx="2"/>
-          </p:nvPr>
-        </p:nvSpPr>
-        <p:spPr/>
-        <p:txBody>
-          <a:bodyPr/>
-          <a:lstStyle/>
-          <a:p>
-            <a:fld id="{A545BEB9-5B1B-DB4F-AD5C-E6F694244147}" type="datetime1">
-              <a:rPr lang="fr-FR" smtClean="0"/>
-              <a:t>07/09/15</a:t>
-            </a:fld>
-            <a:endParaRPr lang="fr-FR" dirty="0"/>
-          </a:p>
-        </p:txBody>
-      </p:sp>
-    </p:spTree>
-    <p:extLst>
-      <p:ext uri="{BB962C8B-B14F-4D97-AF65-F5344CB8AC3E}">
-        <p14:creationId xmlns:p14="http://schemas.microsoft.com/office/powerpoint/2010/main" val="3716900625"/>
-      </p:ext>
-    </p:extLst>
-  </p:cSld>
-  <p:clrMapOvr>
-    <a:masterClrMapping/>
-  </p:clrMapOvr>
-</p:sld>
-</file>
-
-<file path=ppt/slides/slide53.xml><?xml version="1.0" encoding="utf-8"?>
-<p:sld xmlns:a="http://schemas.openxmlformats.org/drawingml/2006/main" xmlns:r="http://schemas.openxmlformats.org/officeDocument/2006/relationships" xmlns:p="http://schemas.openxmlformats.org/presentationml/2006/main">
-  <p:cSld>
-    <p:spTree>
-      <p:nvGrpSpPr>
-        <p:cNvPr id="1" name=""/>
-        <p:cNvGrpSpPr/>
-        <p:nvPr/>
-      </p:nvGrpSpPr>
-      <p:grpSpPr>
-        <a:xfrm>
-          <a:off x="0" y="0"/>
-          <a:ext cx="0" cy="0"/>
-          <a:chOff x="0" y="0"/>
-          <a:chExt cx="0" cy="0"/>
-        </a:xfrm>
-      </p:grpSpPr>
-      <p:sp>
-        <p:nvSpPr>
-          <p:cNvPr id="7" name="Titre 6"/>
-          <p:cNvSpPr>
-            <a:spLocks noGrp="1"/>
-          </p:cNvSpPr>
-          <p:nvPr>
-            <p:ph type="title"/>
-          </p:nvPr>
-        </p:nvSpPr>
-        <p:spPr/>
-        <p:txBody>
-          <a:bodyPr/>
-          <a:lstStyle/>
-          <a:p>
-            <a:endParaRPr lang="fr-FR"/>
-          </a:p>
-        </p:txBody>
-      </p:sp>
-      <p:sp>
-        <p:nvSpPr>
-          <p:cNvPr id="3" name="Espace réservé du contenu 2"/>
-          <p:cNvSpPr>
-            <a:spLocks noGrp="1"/>
-          </p:cNvSpPr>
-          <p:nvPr>
-            <p:ph idx="1"/>
-          </p:nvPr>
-        </p:nvSpPr>
-        <p:spPr/>
-        <p:txBody>
-          <a:bodyPr/>
-          <a:lstStyle/>
-          <a:p>
-            <a:r>
-              <a:rPr lang="fr-FR" dirty="0" smtClean="0"/>
-              <a:t>Et ….</a:t>
-            </a:r>
-          </a:p>
-          <a:p>
-            <a:r>
-              <a:rPr lang="fr-FR" dirty="0" smtClean="0"/>
-              <a:t>Maintenant …</a:t>
-            </a:r>
-          </a:p>
-          <a:p>
-            <a:endParaRPr lang="fr-FR" dirty="0"/>
-          </a:p>
-          <a:p>
-            <a:endParaRPr lang="fr-FR" dirty="0" smtClean="0"/>
-          </a:p>
-          <a:p>
-            <a:r>
-              <a:rPr lang="fr-FR" dirty="0" smtClean="0"/>
-              <a:t>Vous pouvez réaliser votre dernier commit pour le TP précédent.</a:t>
-            </a:r>
-          </a:p>
-          <a:p>
-            <a:endParaRPr lang="fr-FR" dirty="0"/>
-          </a:p>
-        </p:txBody>
-      </p:sp>
-      <p:sp>
-        <p:nvSpPr>
-          <p:cNvPr id="6" name="Espace réservé du pied de page 5"/>
-          <p:cNvSpPr>
-            <a:spLocks noGrp="1"/>
-          </p:cNvSpPr>
-          <p:nvPr>
-            <p:ph type="ftr" sz="quarter" idx="3"/>
-          </p:nvPr>
-        </p:nvSpPr>
-        <p:spPr/>
-        <p:txBody>
-          <a:bodyPr/>
-          <a:lstStyle/>
-          <a:p>
-            <a:r>
-              <a:rPr lang="fr-FR" dirty="0" smtClean="0"/>
-              <a:t>Rémi Ronfard - GMIN317 – GPU </a:t>
-            </a:r>
-            <a:endParaRPr lang="fr-FR" b="1" dirty="0"/>
-          </a:p>
-        </p:txBody>
-      </p:sp>
-      <p:sp>
-        <p:nvSpPr>
-          <p:cNvPr id="4" name="Espace réservé du numéro de diapositive 3"/>
-          <p:cNvSpPr>
-            <a:spLocks noGrp="1"/>
-          </p:cNvSpPr>
-          <p:nvPr>
-            <p:ph type="sldNum" sz="quarter" idx="4"/>
-          </p:nvPr>
-        </p:nvSpPr>
-        <p:spPr/>
-        <p:txBody>
-          <a:bodyPr/>
-          <a:lstStyle/>
-          <a:p>
-            <a:fld id="{A6C87E8C-A1B1-CC4A-8C89-9A370644B80A}" type="slidenum">
-              <a:rPr lang="fr-FR" smtClean="0"/>
-              <a:pPr/>
-              <a:t>53</a:t>
-            </a:fld>
-            <a:endParaRPr lang="fr-FR" dirty="0"/>
-          </a:p>
-        </p:txBody>
-      </p:sp>
-      <p:sp>
-        <p:nvSpPr>
-          <p:cNvPr id="5" name="Espace réservé de la date 4"/>
-          <p:cNvSpPr>
-            <a:spLocks noGrp="1"/>
-          </p:cNvSpPr>
-          <p:nvPr>
-            <p:ph type="dt" sz="half" idx="2"/>
-          </p:nvPr>
-        </p:nvSpPr>
-        <p:spPr/>
-        <p:txBody>
-          <a:bodyPr/>
-          <a:lstStyle/>
-          <a:p>
-            <a:fld id="{7EFCF959-3884-8E4E-A16A-44DD36307CD3}" type="datetime1">
-              <a:rPr lang="fr-FR" smtClean="0"/>
-              <a:t>07/09/15</a:t>
-            </a:fld>
-            <a:endParaRPr lang="fr-FR" dirty="0"/>
-          </a:p>
-        </p:txBody>
-      </p:sp>
-    </p:spTree>
-    <p:extLst>
-      <p:ext uri="{BB962C8B-B14F-4D97-AF65-F5344CB8AC3E}">
-        <p14:creationId xmlns:p14="http://schemas.microsoft.com/office/powerpoint/2010/main" val="2821294846"/>
-      </p:ext>
-    </p:extLst>
-  </p:cSld>
-  <p:clrMapOvr>
-    <a:masterClrMapping/>
-  </p:clrMapOvr>
-</p:sld>
-</file>
-
-<file path=ppt/slides/slide54.xml><?xml version="1.0" encoding="utf-8"?>
-<p:sld xmlns:a="http://schemas.openxmlformats.org/drawingml/2006/main" xmlns:r="http://schemas.openxmlformats.org/officeDocument/2006/relationships" xmlns:p="http://schemas.openxmlformats.org/presentationml/2006/main">
-  <p:cSld>
-    <p:spTree>
-      <p:nvGrpSpPr>
-        <p:cNvPr id="1" name=""/>
-        <p:cNvGrpSpPr/>
-        <p:nvPr/>
-      </p:nvGrpSpPr>
-      <p:grpSpPr>
-        <a:xfrm>
-          <a:off x="0" y="0"/>
-          <a:ext cx="0" cy="0"/>
-          <a:chOff x="0" y="0"/>
-          <a:chExt cx="0" cy="0"/>
-        </a:xfrm>
-      </p:grpSpPr>
-      <p:sp>
-        <p:nvSpPr>
-          <p:cNvPr id="7" name="Titre 6"/>
-          <p:cNvSpPr>
-            <a:spLocks noGrp="1"/>
-          </p:cNvSpPr>
-          <p:nvPr>
-            <p:ph type="title"/>
-          </p:nvPr>
-        </p:nvSpPr>
-        <p:spPr/>
-        <p:txBody>
-          <a:bodyPr/>
-          <a:lstStyle/>
-          <a:p>
-            <a:endParaRPr lang="fr-FR"/>
-          </a:p>
-        </p:txBody>
-      </p:sp>
-      <p:sp>
-        <p:nvSpPr>
-          <p:cNvPr id="3" name="Espace réservé du contenu 2"/>
-          <p:cNvSpPr>
-            <a:spLocks noGrp="1"/>
-          </p:cNvSpPr>
-          <p:nvPr>
-            <p:ph idx="1"/>
-          </p:nvPr>
-        </p:nvSpPr>
-        <p:spPr/>
-        <p:txBody>
-          <a:bodyPr anchor="ctr"/>
-          <a:lstStyle/>
-          <a:p>
-            <a:pPr marL="0" indent="0" algn="ctr">
-              <a:buNone/>
-            </a:pPr>
-            <a:r>
-              <a:rPr lang="fr-FR" dirty="0" smtClean="0"/>
-              <a:t>TP</a:t>
-            </a:r>
-            <a:endParaRPr lang="fr-FR" dirty="0"/>
-          </a:p>
-        </p:txBody>
-      </p:sp>
-      <p:sp>
-        <p:nvSpPr>
-          <p:cNvPr id="6" name="Espace réservé du pied de page 5"/>
-          <p:cNvSpPr>
-            <a:spLocks noGrp="1"/>
-          </p:cNvSpPr>
-          <p:nvPr>
-            <p:ph type="ftr" sz="quarter" idx="3"/>
-          </p:nvPr>
-        </p:nvSpPr>
-        <p:spPr/>
-        <p:txBody>
-          <a:bodyPr/>
-          <a:lstStyle/>
-          <a:p>
-            <a:r>
-              <a:rPr lang="fr-FR" dirty="0" smtClean="0"/>
-              <a:t>Rémi Ronfard - GMIN317 – GPU </a:t>
-            </a:r>
-            <a:endParaRPr lang="fr-FR" b="1" dirty="0"/>
-          </a:p>
-        </p:txBody>
-      </p:sp>
-      <p:sp>
-        <p:nvSpPr>
-          <p:cNvPr id="4" name="Espace réservé du numéro de diapositive 3"/>
-          <p:cNvSpPr>
-            <a:spLocks noGrp="1"/>
-          </p:cNvSpPr>
-          <p:nvPr>
-            <p:ph type="sldNum" sz="quarter" idx="4"/>
-          </p:nvPr>
-        </p:nvSpPr>
-        <p:spPr/>
-        <p:txBody>
-          <a:bodyPr/>
-          <a:lstStyle/>
-          <a:p>
-            <a:fld id="{A6C87E8C-A1B1-CC4A-8C89-9A370644B80A}" type="slidenum">
-              <a:rPr lang="fr-FR" smtClean="0"/>
-              <a:pPr/>
-              <a:t>54</a:t>
-            </a:fld>
-            <a:endParaRPr lang="fr-FR" dirty="0"/>
-          </a:p>
-        </p:txBody>
-      </p:sp>
-      <p:sp>
-        <p:nvSpPr>
           <p:cNvPr id="5" name="Espace réservé de la date 4"/>
           <p:cNvSpPr>
             <a:spLocks noGrp="1"/>
@@ -17304,7 +16984,7 @@
           <a:p>
             <a:fld id="{222285E8-E2F9-7246-B136-68857E125226}" type="datetime1">
               <a:rPr lang="fr-FR" smtClean="0"/>
-              <a:t>07/09/15</a:t>
+              <a:t>18/09/15</a:t>
             </a:fld>
             <a:endParaRPr lang="fr-FR" dirty="0"/>
           </a:p>
@@ -18041,7 +17721,7 @@
           <a:p>
             <a:fld id="{FE7B2163-DA27-1D40-8FE7-B7936F242F0F}" type="datetime1">
               <a:rPr lang="fr-FR" smtClean="0"/>
-              <a:t>07/09/15</a:t>
+              <a:t>18/09/15</a:t>
             </a:fld>
             <a:endParaRPr lang="fr-FR" dirty="0"/>
           </a:p>
@@ -18553,7 +18233,7 @@
           <a:p>
             <a:fld id="{AB6F4FCD-2640-9B46-8D83-08AC490C2F74}" type="datetime1">
               <a:rPr lang="fr-FR" smtClean="0"/>
-              <a:t>07/09/15</a:t>
+              <a:t>18/09/15</a:t>
             </a:fld>
             <a:endParaRPr lang="fr-FR" dirty="0"/>
           </a:p>
@@ -19048,7 +18728,7 @@
           <a:p>
             <a:fld id="{621B7D1E-FCC4-E046-A93E-739DEA071E9E}" type="datetime1">
               <a:rPr lang="fr-FR" smtClean="0"/>
-              <a:t>07/09/15</a:t>
+              <a:t>18/09/15</a:t>
             </a:fld>
             <a:endParaRPr lang="fr-FR" dirty="0"/>
           </a:p>
@@ -19268,7 +18948,7 @@
           <a:p>
             <a:fld id="{33647793-232B-5141-9AE6-153DB49F727B}" type="datetime1">
               <a:rPr lang="fr-FR" smtClean="0"/>
-              <a:t>07/09/15</a:t>
+              <a:t>18/09/15</a:t>
             </a:fld>
             <a:endParaRPr lang="fr-FR" dirty="0"/>
           </a:p>

</xml_diff>